<commit_message>
report final lab finsihed
</commit_message>
<xml_diff>
--- a/课外实践/网络数据检测与分析.pptx
+++ b/课外实践/网络数据检测与分析.pptx
@@ -5,7 +5,7 @@
     <p:sldMasterId id="2147483648" r:id="rId1"/>
   </p:sldMasterIdLst>
   <p:notesMasterIdLst>
-    <p:notesMasterId r:id="rId18"/>
+    <p:notesMasterId r:id="rId19"/>
   </p:notesMasterIdLst>
   <p:sldIdLst>
     <p:sldId id="256" r:id="rId2"/>
@@ -24,6 +24,7 @@
     <p:sldId id="271" r:id="rId15"/>
     <p:sldId id="273" r:id="rId16"/>
     <p:sldId id="272" r:id="rId17"/>
+    <p:sldId id="274" r:id="rId18"/>
   </p:sldIdLst>
   <p:sldSz cx="12192000" cy="6858000"/>
   <p:notesSz cx="6858000" cy="9144000"/>
@@ -212,7 +213,7 @@
           <a:p>
             <a:fld id="{57CF2443-159A-48F7-B6F3-861173EF146E}" type="datetimeFigureOut">
               <a:rPr lang="zh-CN" altLang="en-US" smtClean="0"/>
-              <a:t>2021/4/15</a:t>
+              <a:t>2021/4/21</a:t>
             </a:fld>
             <a:endParaRPr lang="zh-CN" altLang="en-US"/>
           </a:p>
@@ -526,19 +527,15 @@
           <a:p>
             <a:r>
               <a:rPr lang="zh-CN" altLang="en-US" dirty="0" smtClean="0"/>
-              <a:t>这是我选择了</a:t>
-            </a:r>
-            <a:r>
-              <a:rPr lang="en-US" altLang="zh-CN" dirty="0" err="1" smtClean="0"/>
-              <a:t>wlan</a:t>
+              <a:t>大家好</a:t>
+            </a:r>
+            <a:r>
+              <a:rPr lang="en-US" altLang="zh-CN" dirty="0" smtClean="0"/>
+              <a:t>!</a:t>
             </a:r>
             <a:r>
               <a:rPr lang="zh-CN" altLang="en-US" dirty="0" smtClean="0"/>
-              <a:t>抓包的界面</a:t>
-            </a:r>
-            <a:r>
-              <a:rPr lang="en-US" altLang="zh-CN" dirty="0" smtClean="0"/>
-              <a:t>, </a:t>
+              <a:t>我们小组做的是分享用</a:t>
             </a:r>
             <a:r>
               <a:rPr lang="en-US" altLang="zh-CN" dirty="0" err="1" smtClean="0"/>
@@ -546,63 +543,7 @@
             </a:r>
             <a:r>
               <a:rPr lang="zh-CN" altLang="en-US" dirty="0" smtClean="0"/>
-              <a:t>这个软件好像还在更新</a:t>
-            </a:r>
-            <a:r>
-              <a:rPr lang="en-US" altLang="zh-CN" dirty="0" smtClean="0"/>
-              <a:t>, UI</a:t>
-            </a:r>
-            <a:r>
-              <a:rPr lang="zh-CN" altLang="en-US" dirty="0" smtClean="0"/>
-              <a:t>做的也是很不错</a:t>
-            </a:r>
-            <a:r>
-              <a:rPr lang="en-US" altLang="zh-CN" dirty="0" smtClean="0"/>
-              <a:t>, </a:t>
-            </a:r>
-            <a:r>
-              <a:rPr lang="zh-CN" altLang="en-US" dirty="0" smtClean="0"/>
-              <a:t>我们可以看到显示了编号</a:t>
-            </a:r>
-            <a:r>
-              <a:rPr lang="en-US" altLang="zh-CN" dirty="0" smtClean="0"/>
-              <a:t>, </a:t>
-            </a:r>
-            <a:r>
-              <a:rPr lang="zh-CN" altLang="en-US" dirty="0" smtClean="0"/>
-              <a:t>实践</a:t>
-            </a:r>
-            <a:r>
-              <a:rPr lang="en-US" altLang="zh-CN" dirty="0" smtClean="0"/>
-              <a:t>, </a:t>
-            </a:r>
-            <a:r>
-              <a:rPr lang="zh-CN" altLang="en-US" dirty="0" smtClean="0"/>
-              <a:t>源地址</a:t>
-            </a:r>
-            <a:r>
-              <a:rPr lang="en-US" altLang="zh-CN" dirty="0" smtClean="0"/>
-              <a:t>, </a:t>
-            </a:r>
-            <a:r>
-              <a:rPr lang="zh-CN" altLang="en-US" dirty="0" smtClean="0"/>
-              <a:t>目标地址</a:t>
-            </a:r>
-            <a:r>
-              <a:rPr lang="en-US" altLang="zh-CN" dirty="0" smtClean="0"/>
-              <a:t>, </a:t>
-            </a:r>
-            <a:r>
-              <a:rPr lang="zh-CN" altLang="en-US" dirty="0" smtClean="0"/>
-              <a:t>协议</a:t>
-            </a:r>
-            <a:r>
-              <a:rPr lang="en-US" altLang="zh-CN" dirty="0" smtClean="0"/>
-              <a:t>, </a:t>
-            </a:r>
-            <a:r>
-              <a:rPr lang="zh-CN" altLang="en-US" dirty="0" smtClean="0"/>
-              <a:t>长度</a:t>
+              <a:t>来分析网络</a:t>
             </a:r>
             <a:r>
               <a:rPr lang="en-US" altLang="zh-CN" dirty="0" smtClean="0"/>
@@ -610,7 +551,7 @@
             </a:r>
             <a:r>
               <a:rPr lang="zh-CN" altLang="en-US" dirty="0" smtClean="0"/>
-              <a:t>封包信息</a:t>
+              <a:t>这个在学在浙大的课件上也有分享</a:t>
             </a:r>
             <a:r>
               <a:rPr lang="en-US" altLang="zh-CN" dirty="0" smtClean="0"/>
@@ -637,7 +578,7 @@
           <a:p>
             <a:fld id="{0B3D93B1-B6F8-47A3-AA63-01CB63EDF94B}" type="slidenum">
               <a:rPr lang="zh-CN" altLang="en-US" smtClean="0"/>
-              <a:t>2</a:t>
+              <a:t>1</a:t>
             </a:fld>
             <a:endParaRPr lang="zh-CN" altLang="en-US"/>
           </a:p>
@@ -646,7 +587,7 @@
     </p:spTree>
     <p:extLst>
       <p:ext uri="{BB962C8B-B14F-4D97-AF65-F5344CB8AC3E}">
-        <p14:creationId xmlns:p14="http://schemas.microsoft.com/office/powerpoint/2010/main" val="2891931892"/>
+        <p14:creationId xmlns:p14="http://schemas.microsoft.com/office/powerpoint/2010/main" val="2005516840"/>
       </p:ext>
     </p:extLst>
   </p:cSld>
@@ -700,152 +641,280 @@
           <a:bodyPr/>
           <a:lstStyle/>
           <a:p>
-            <a:pPr marL="0" lvl="0" indent="0" eaLnBrk="0" fontAlgn="base" hangingPunct="0">
-              <a:lnSpc>
-                <a:spcPct val="100000"/>
-              </a:lnSpc>
-              <a:spcBef>
-                <a:spcPct val="0"/>
-              </a:spcBef>
-              <a:spcAft>
-                <a:spcPct val="0"/>
-              </a:spcAft>
-              <a:buNone/>
-            </a:pPr>
-            <a:r>
-              <a:rPr lang="en-US" altLang="zh-CN" sz="1200" dirty="0" smtClean="0">
+            <a:r>
+              <a:rPr lang="zh-CN" altLang="zh-CN" sz="1200" kern="1200" dirty="0" smtClean="0">
                 <a:solidFill>
-                  <a:srgbClr val="313135"/>
+                  <a:schemeClr val="tx1"/>
                 </a:solidFill>
-                <a:latin typeface="Arial Unicode MS"/>
+                <a:effectLst/>
+                <a:latin typeface="+mn-lt"/>
+                <a:ea typeface="+mn-ea"/>
+                <a:cs typeface="+mn-cs"/>
               </a:rPr>
-              <a:t>80</a:t>
-            </a:r>
-            <a:r>
-              <a:rPr lang="zh-CN" altLang="en-US" sz="1200" dirty="0" smtClean="0">
+              <a:t>四次挥手</a:t>
+            </a:r>
+            <a:r>
+              <a:rPr lang="en-US" altLang="zh-CN" sz="1200" kern="1200" dirty="0" smtClean="0">
                 <a:solidFill>
-                  <a:srgbClr val="313135"/>
+                  <a:schemeClr val="tx1"/>
                 </a:solidFill>
-                <a:latin typeface="Arial Unicode MS"/>
+                <a:effectLst/>
+                <a:latin typeface="+mn-lt"/>
+                <a:ea typeface="+mn-ea"/>
+                <a:cs typeface="+mn-cs"/>
+              </a:rPr>
+              <a:t>, </a:t>
+            </a:r>
+            <a:r>
+              <a:rPr lang="zh-CN" altLang="zh-CN" sz="1200" kern="1200" dirty="0" smtClean="0">
+                <a:solidFill>
+                  <a:schemeClr val="tx1"/>
+                </a:solidFill>
+                <a:effectLst/>
+                <a:latin typeface="+mn-lt"/>
+                <a:ea typeface="+mn-ea"/>
+                <a:cs typeface="+mn-cs"/>
+              </a:rPr>
+              <a:t>客户端发送结束包</a:t>
+            </a:r>
+            <a:r>
+              <a:rPr lang="en-US" altLang="zh-CN" sz="1200" kern="1200" dirty="0" err="1" smtClean="0">
+                <a:solidFill>
+                  <a:schemeClr val="tx1"/>
+                </a:solidFill>
+                <a:effectLst/>
+                <a:latin typeface="+mn-lt"/>
+                <a:ea typeface="+mn-ea"/>
+                <a:cs typeface="+mn-cs"/>
+              </a:rPr>
+              <a:t>fin,ack</a:t>
+            </a:r>
+            <a:r>
+              <a:rPr lang="zh-CN" altLang="zh-CN" sz="1200" kern="1200" dirty="0" smtClean="0">
+                <a:solidFill>
+                  <a:schemeClr val="tx1"/>
+                </a:solidFill>
+                <a:effectLst/>
+                <a:latin typeface="+mn-lt"/>
+                <a:ea typeface="+mn-ea"/>
+                <a:cs typeface="+mn-cs"/>
+              </a:rPr>
+              <a:t>标志位为</a:t>
+            </a:r>
+            <a:r>
+              <a:rPr lang="en-US" altLang="zh-CN" sz="1200" kern="1200" dirty="0" smtClean="0">
+                <a:solidFill>
+                  <a:schemeClr val="tx1"/>
+                </a:solidFill>
+                <a:effectLst/>
+                <a:latin typeface="+mn-lt"/>
+                <a:ea typeface="+mn-ea"/>
+                <a:cs typeface="+mn-cs"/>
+              </a:rPr>
+              <a:t>1, </a:t>
+            </a:r>
+            <a:r>
+              <a:rPr lang="zh-CN" altLang="zh-CN" sz="1200" kern="1200" dirty="0" smtClean="0">
+                <a:solidFill>
+                  <a:schemeClr val="tx1"/>
+                </a:solidFill>
+                <a:effectLst/>
+                <a:latin typeface="+mn-lt"/>
+                <a:ea typeface="+mn-ea"/>
+                <a:cs typeface="+mn-cs"/>
+              </a:rPr>
+              <a:t>服务器发送</a:t>
+            </a:r>
+            <a:r>
+              <a:rPr lang="en-US" altLang="zh-CN" sz="1200" kern="1200" dirty="0" err="1" smtClean="0">
+                <a:solidFill>
+                  <a:schemeClr val="tx1"/>
+                </a:solidFill>
+                <a:effectLst/>
+                <a:latin typeface="+mn-lt"/>
+                <a:ea typeface="+mn-ea"/>
+                <a:cs typeface="+mn-cs"/>
+              </a:rPr>
+              <a:t>ack</a:t>
+            </a:r>
+            <a:r>
+              <a:rPr lang="en-US" altLang="zh-CN" sz="1200" kern="1200" dirty="0" smtClean="0">
+                <a:solidFill>
+                  <a:schemeClr val="tx1"/>
+                </a:solidFill>
+                <a:effectLst/>
+                <a:latin typeface="+mn-lt"/>
+                <a:ea typeface="+mn-ea"/>
+                <a:cs typeface="+mn-cs"/>
+              </a:rPr>
+              <a:t>, </a:t>
+            </a:r>
+            <a:r>
+              <a:rPr lang="zh-CN" altLang="zh-CN" sz="1200" kern="1200" dirty="0" smtClean="0">
+                <a:solidFill>
+                  <a:schemeClr val="tx1"/>
+                </a:solidFill>
+                <a:effectLst/>
+                <a:latin typeface="+mn-lt"/>
+                <a:ea typeface="+mn-ea"/>
+                <a:cs typeface="+mn-cs"/>
+              </a:rPr>
+              <a:t>服务器完成最后的发送后</a:t>
+            </a:r>
+            <a:r>
+              <a:rPr lang="en-US" altLang="zh-CN" sz="1200" kern="1200" dirty="0" smtClean="0">
+                <a:solidFill>
+                  <a:schemeClr val="tx1"/>
+                </a:solidFill>
+                <a:effectLst/>
+                <a:latin typeface="+mn-lt"/>
+                <a:ea typeface="+mn-ea"/>
+                <a:cs typeface="+mn-cs"/>
+              </a:rPr>
+              <a:t>, </a:t>
+            </a:r>
+            <a:r>
+              <a:rPr lang="zh-CN" altLang="zh-CN" sz="1200" kern="1200" dirty="0" smtClean="0">
+                <a:solidFill>
+                  <a:schemeClr val="tx1"/>
+                </a:solidFill>
+                <a:effectLst/>
+                <a:latin typeface="+mn-lt"/>
+                <a:ea typeface="+mn-ea"/>
+                <a:cs typeface="+mn-cs"/>
+              </a:rPr>
+              <a:t>发送包</a:t>
+            </a:r>
+            <a:r>
+              <a:rPr lang="en-US" altLang="zh-CN" sz="1200" kern="1200" dirty="0" smtClean="0">
+                <a:solidFill>
+                  <a:schemeClr val="tx1"/>
+                </a:solidFill>
+                <a:effectLst/>
+                <a:latin typeface="+mn-lt"/>
+                <a:ea typeface="+mn-ea"/>
+                <a:cs typeface="+mn-cs"/>
+              </a:rPr>
+              <a:t>, fin =1, </a:t>
+            </a:r>
+            <a:r>
+              <a:rPr lang="en-US" altLang="zh-CN" sz="1200" kern="1200" dirty="0" err="1" smtClean="0">
+                <a:solidFill>
+                  <a:schemeClr val="tx1"/>
+                </a:solidFill>
+                <a:effectLst/>
+                <a:latin typeface="+mn-lt"/>
+                <a:ea typeface="+mn-ea"/>
+                <a:cs typeface="+mn-cs"/>
+              </a:rPr>
+              <a:t>ack</a:t>
+            </a:r>
+            <a:r>
+              <a:rPr lang="en-US" altLang="zh-CN" sz="1200" kern="1200" dirty="0" smtClean="0">
+                <a:solidFill>
+                  <a:schemeClr val="tx1"/>
+                </a:solidFill>
+                <a:effectLst/>
+                <a:latin typeface="+mn-lt"/>
+                <a:ea typeface="+mn-ea"/>
+                <a:cs typeface="+mn-cs"/>
+              </a:rPr>
+              <a:t>=1, </a:t>
+            </a:r>
+            <a:r>
+              <a:rPr lang="zh-CN" altLang="zh-CN" sz="1200" kern="1200" dirty="0" smtClean="0">
+                <a:solidFill>
+                  <a:schemeClr val="tx1"/>
+                </a:solidFill>
+                <a:effectLst/>
+                <a:latin typeface="+mn-lt"/>
+                <a:ea typeface="+mn-ea"/>
+                <a:cs typeface="+mn-cs"/>
+              </a:rPr>
+              <a:t>然后客户端返回</a:t>
+            </a:r>
+            <a:r>
+              <a:rPr lang="en-US" altLang="zh-CN" sz="1200" kern="1200" dirty="0" err="1" smtClean="0">
+                <a:solidFill>
+                  <a:schemeClr val="tx1"/>
+                </a:solidFill>
+                <a:effectLst/>
+                <a:latin typeface="+mn-lt"/>
+                <a:ea typeface="+mn-ea"/>
+                <a:cs typeface="+mn-cs"/>
+              </a:rPr>
+              <a:t>ack</a:t>
+            </a:r>
+            <a:r>
+              <a:rPr lang="en-US" altLang="zh-CN" sz="1200" kern="1200" dirty="0" smtClean="0">
+                <a:solidFill>
+                  <a:schemeClr val="tx1"/>
+                </a:solidFill>
+                <a:effectLst/>
+                <a:latin typeface="+mn-lt"/>
+                <a:ea typeface="+mn-ea"/>
+                <a:cs typeface="+mn-cs"/>
+              </a:rPr>
+              <a:t>= 1.  443</a:t>
+            </a:r>
+            <a:r>
+              <a:rPr lang="zh-CN" altLang="zh-CN" sz="1200" kern="1200" dirty="0" smtClean="0">
+                <a:solidFill>
+                  <a:schemeClr val="tx1"/>
+                </a:solidFill>
+                <a:effectLst/>
+                <a:latin typeface="+mn-lt"/>
+                <a:ea typeface="+mn-ea"/>
+                <a:cs typeface="+mn-cs"/>
               </a:rPr>
               <a:t>是</a:t>
             </a:r>
             <a:r>
-              <a:rPr lang="en-US" altLang="zh-CN" sz="1200" dirty="0" smtClean="0">
+              <a:rPr lang="en-US" altLang="zh-CN" sz="1200" kern="1200" dirty="0" smtClean="0">
                 <a:solidFill>
-                  <a:srgbClr val="313135"/>
+                  <a:schemeClr val="tx1"/>
                 </a:solidFill>
-                <a:latin typeface="Arial Unicode MS"/>
+                <a:effectLst/>
+                <a:latin typeface="+mn-lt"/>
+                <a:ea typeface="+mn-ea"/>
+                <a:cs typeface="+mn-cs"/>
               </a:rPr>
-              <a:t>http</a:t>
-            </a:r>
-            <a:r>
-              <a:rPr lang="zh-CN" altLang="en-US" sz="1200" dirty="0" smtClean="0">
+              <a:t>https </a:t>
+            </a:r>
+            <a:r>
+              <a:rPr lang="zh-CN" altLang="zh-CN" sz="1200" kern="1200" dirty="0" smtClean="0">
                 <a:solidFill>
-                  <a:srgbClr val="313135"/>
+                  <a:schemeClr val="tx1"/>
                 </a:solidFill>
-                <a:latin typeface="Arial Unicode MS"/>
-              </a:rPr>
-              <a:t>的端口</a:t>
-            </a:r>
-            <a:r>
-              <a:rPr lang="en-US" altLang="zh-CN" sz="1200" dirty="0" smtClean="0">
-                <a:solidFill>
-                  <a:srgbClr val="313135"/>
-                </a:solidFill>
-                <a:latin typeface="Arial Unicode MS"/>
-              </a:rPr>
-              <a:t>, 443</a:t>
-            </a:r>
-            <a:r>
-              <a:rPr lang="zh-CN" altLang="en-US" sz="1200" dirty="0" smtClean="0">
-                <a:solidFill>
-                  <a:srgbClr val="313135"/>
-                </a:solidFill>
-                <a:latin typeface="Arial Unicode MS"/>
-              </a:rPr>
-              <a:t>是</a:t>
-            </a:r>
-            <a:r>
-              <a:rPr lang="en-US" altLang="zh-CN" sz="1200" dirty="0" smtClean="0">
-                <a:solidFill>
-                  <a:srgbClr val="313135"/>
-                </a:solidFill>
-                <a:latin typeface="Arial Unicode MS"/>
-              </a:rPr>
-              <a:t>https</a:t>
-            </a:r>
-            <a:r>
-              <a:rPr lang="zh-CN" altLang="en-US" sz="1200" dirty="0" smtClean="0">
-                <a:solidFill>
-                  <a:srgbClr val="313135"/>
-                </a:solidFill>
-                <a:latin typeface="Arial Unicode MS"/>
+                <a:effectLst/>
+                <a:latin typeface="+mn-lt"/>
+                <a:ea typeface="+mn-ea"/>
+                <a:cs typeface="+mn-cs"/>
               </a:rPr>
               <a:t>端口</a:t>
             </a:r>
-            <a:endParaRPr lang="en-US" altLang="zh-CN" sz="1200" dirty="0" smtClean="0">
-              <a:solidFill>
-                <a:srgbClr val="313135"/>
-              </a:solidFill>
-              <a:latin typeface="Arial Unicode MS"/>
-            </a:endParaRPr>
-          </a:p>
-          <a:p>
-            <a:pPr marL="0" lvl="0" indent="0" eaLnBrk="0" fontAlgn="base" hangingPunct="0">
-              <a:lnSpc>
-                <a:spcPct val="100000"/>
-              </a:lnSpc>
-              <a:spcBef>
-                <a:spcPct val="0"/>
-              </a:spcBef>
-              <a:spcAft>
-                <a:spcPct val="0"/>
-              </a:spcAft>
-              <a:buNone/>
-            </a:pPr>
-            <a:r>
-              <a:rPr lang="en-US" altLang="zh-CN" dirty="0" smtClean="0"/>
-              <a:t>8080</a:t>
-            </a:r>
-            <a:r>
-              <a:rPr lang="zh-CN" altLang="en-US" dirty="0" smtClean="0"/>
-              <a:t>端口是用于</a:t>
-            </a:r>
-            <a:r>
-              <a:rPr lang="en-US" altLang="zh-CN" dirty="0" smtClean="0"/>
-              <a:t>WWW</a:t>
-            </a:r>
-            <a:r>
-              <a:rPr lang="zh-CN" altLang="en-US" dirty="0" smtClean="0"/>
-              <a:t>代劳服务</a:t>
-            </a:r>
-            <a:r>
-              <a:rPr lang="en-US" altLang="zh-CN" dirty="0" smtClean="0"/>
-              <a:t>,</a:t>
-            </a:r>
-            <a:endParaRPr kumimoji="0" lang="zh-CN" altLang="zh-CN" sz="2800" b="0" i="0" u="none" strike="noStrike" cap="none" normalizeH="0" baseline="0" dirty="0" smtClean="0">
-              <a:ln>
-                <a:noFill/>
-              </a:ln>
+            <a:r>
+              <a:rPr lang="en-US" altLang="zh-CN" sz="1200" kern="1200" dirty="0" smtClean="0">
+                <a:solidFill>
+                  <a:schemeClr val="tx1"/>
+                </a:solidFill>
+                <a:effectLst/>
+                <a:latin typeface="+mn-lt"/>
+                <a:ea typeface="+mn-ea"/>
+                <a:cs typeface="+mn-cs"/>
+              </a:rPr>
+              <a:t>.  </a:t>
+            </a:r>
+            <a:endParaRPr lang="zh-CN" altLang="zh-CN" sz="1200" kern="1200" dirty="0">
               <a:solidFill>
                 <a:schemeClr val="tx1"/>
               </a:solidFill>
               <a:effectLst/>
-              <a:latin typeface="Arial" panose="020B0604020202020204" pitchFamily="34" charset="0"/>
+              <a:latin typeface="+mn-lt"/>
+              <a:ea typeface="+mn-ea"/>
+              <a:cs typeface="+mn-cs"/>
             </a:endParaRPr>
           </a:p>
-          <a:p>
-            <a:r>
-              <a:rPr lang="zh-CN" altLang="en-US" dirty="0" smtClean="0"/>
-              <a:t>看这个</a:t>
-            </a:r>
-            <a:r>
-              <a:rPr lang="en-US" altLang="zh-CN" dirty="0" smtClean="0"/>
-              <a:t>post </a:t>
-            </a:r>
-            <a:endParaRPr lang="zh-CN" altLang="en-US" dirty="0"/>
-          </a:p>
         </p:txBody>
       </p:sp>
       <p:sp>
@@ -865,7 +934,7 @@
           <a:p>
             <a:fld id="{0B3D93B1-B6F8-47A3-AA63-01CB63EDF94B}" type="slidenum">
               <a:rPr lang="zh-CN" altLang="en-US" smtClean="0"/>
-              <a:t>13</a:t>
+              <a:t>11</a:t>
             </a:fld>
             <a:endParaRPr lang="zh-CN" altLang="en-US"/>
           </a:p>
@@ -874,7 +943,7 @@
     </p:spTree>
     <p:extLst>
       <p:ext uri="{BB962C8B-B14F-4D97-AF65-F5344CB8AC3E}">
-        <p14:creationId xmlns:p14="http://schemas.microsoft.com/office/powerpoint/2010/main" val="944223539"/>
+        <p14:creationId xmlns:p14="http://schemas.microsoft.com/office/powerpoint/2010/main" val="1581839253"/>
       </p:ext>
     </p:extLst>
   </p:cSld>
@@ -930,6 +999,342 @@
           <a:p>
             <a:r>
               <a:rPr lang="zh-CN" altLang="en-US" dirty="0" smtClean="0"/>
+              <a:t>我们看到可以抓到</a:t>
+            </a:r>
+            <a:r>
+              <a:rPr lang="en-US" altLang="zh-CN" dirty="0" err="1" smtClean="0"/>
+              <a:t>qq</a:t>
+            </a:r>
+            <a:r>
+              <a:rPr lang="zh-CN" altLang="en-US" dirty="0" smtClean="0"/>
+              <a:t>的数据包</a:t>
+            </a:r>
+            <a:r>
+              <a:rPr lang="en-US" altLang="zh-CN" dirty="0" smtClean="0"/>
+              <a:t>. </a:t>
+            </a:r>
+            <a:r>
+              <a:rPr lang="zh-CN" altLang="en-US" dirty="0" smtClean="0"/>
+              <a:t>应用层协议为</a:t>
+            </a:r>
+            <a:r>
+              <a:rPr lang="en-US" altLang="zh-CN" dirty="0" smtClean="0"/>
+              <a:t>OICQ</a:t>
+            </a:r>
+            <a:endParaRPr lang="zh-CN" altLang="en-US" dirty="0"/>
+          </a:p>
+        </p:txBody>
+      </p:sp>
+      <p:sp>
+        <p:nvSpPr>
+          <p:cNvPr id="4" name="灯片编号占位符 3"/>
+          <p:cNvSpPr>
+            <a:spLocks noGrp="1"/>
+          </p:cNvSpPr>
+          <p:nvPr>
+            <p:ph type="sldNum" sz="quarter" idx="10"/>
+          </p:nvPr>
+        </p:nvSpPr>
+        <p:spPr/>
+        <p:txBody>
+          <a:bodyPr/>
+          <a:lstStyle/>
+          <a:p>
+            <a:fld id="{0B3D93B1-B6F8-47A3-AA63-01CB63EDF94B}" type="slidenum">
+              <a:rPr lang="zh-CN" altLang="en-US" smtClean="0"/>
+              <a:t>12</a:t>
+            </a:fld>
+            <a:endParaRPr lang="zh-CN" altLang="en-US"/>
+          </a:p>
+        </p:txBody>
+      </p:sp>
+    </p:spTree>
+    <p:extLst>
+      <p:ext uri="{BB962C8B-B14F-4D97-AF65-F5344CB8AC3E}">
+        <p14:creationId xmlns:p14="http://schemas.microsoft.com/office/powerpoint/2010/main" val="569516348"/>
+      </p:ext>
+    </p:extLst>
+  </p:cSld>
+  <p:clrMapOvr>
+    <a:masterClrMapping/>
+  </p:clrMapOvr>
+</p:notes>
+</file>
+
+<file path=ppt/notesSlides/notesSlide12.xml><?xml version="1.0" encoding="utf-8"?>
+<p:notes xmlns:a="http://schemas.openxmlformats.org/drawingml/2006/main" xmlns:r="http://schemas.openxmlformats.org/officeDocument/2006/relationships" xmlns:p="http://schemas.openxmlformats.org/presentationml/2006/main">
+  <p:cSld>
+    <p:spTree>
+      <p:nvGrpSpPr>
+        <p:cNvPr id="1" name=""/>
+        <p:cNvGrpSpPr/>
+        <p:nvPr/>
+      </p:nvGrpSpPr>
+      <p:grpSpPr>
+        <a:xfrm>
+          <a:off x="0" y="0"/>
+          <a:ext cx="0" cy="0"/>
+          <a:chOff x="0" y="0"/>
+          <a:chExt cx="0" cy="0"/>
+        </a:xfrm>
+      </p:grpSpPr>
+      <p:sp>
+        <p:nvSpPr>
+          <p:cNvPr id="2" name="幻灯片图像占位符 1"/>
+          <p:cNvSpPr>
+            <a:spLocks noGrp="1" noRot="1" noChangeAspect="1"/>
+          </p:cNvSpPr>
+          <p:nvPr>
+            <p:ph type="sldImg"/>
+          </p:nvPr>
+        </p:nvSpPr>
+        <p:spPr/>
+      </p:sp>
+      <p:sp>
+        <p:nvSpPr>
+          <p:cNvPr id="3" name="备注占位符 2"/>
+          <p:cNvSpPr>
+            <a:spLocks noGrp="1"/>
+          </p:cNvSpPr>
+          <p:nvPr>
+            <p:ph type="body" idx="1"/>
+          </p:nvPr>
+        </p:nvSpPr>
+        <p:spPr/>
+        <p:txBody>
+          <a:bodyPr/>
+          <a:lstStyle/>
+          <a:p>
+            <a:pPr marL="0" lvl="0" indent="0" eaLnBrk="0" fontAlgn="base" hangingPunct="0">
+              <a:lnSpc>
+                <a:spcPct val="100000"/>
+              </a:lnSpc>
+              <a:spcBef>
+                <a:spcPct val="0"/>
+              </a:spcBef>
+              <a:spcAft>
+                <a:spcPct val="0"/>
+              </a:spcAft>
+              <a:buNone/>
+            </a:pPr>
+            <a:r>
+              <a:rPr lang="en-US" altLang="zh-CN" sz="1200" dirty="0" smtClean="0">
+                <a:solidFill>
+                  <a:srgbClr val="313135"/>
+                </a:solidFill>
+                <a:latin typeface="Arial Unicode MS"/>
+              </a:rPr>
+              <a:t>80</a:t>
+            </a:r>
+            <a:r>
+              <a:rPr lang="zh-CN" altLang="en-US" sz="1200" dirty="0" smtClean="0">
+                <a:solidFill>
+                  <a:srgbClr val="313135"/>
+                </a:solidFill>
+                <a:latin typeface="Arial Unicode MS"/>
+              </a:rPr>
+              <a:t>是</a:t>
+            </a:r>
+            <a:r>
+              <a:rPr lang="en-US" altLang="zh-CN" sz="1200" dirty="0" smtClean="0">
+                <a:solidFill>
+                  <a:srgbClr val="313135"/>
+                </a:solidFill>
+                <a:latin typeface="Arial Unicode MS"/>
+              </a:rPr>
+              <a:t>http</a:t>
+            </a:r>
+            <a:r>
+              <a:rPr lang="zh-CN" altLang="en-US" sz="1200" dirty="0" smtClean="0">
+                <a:solidFill>
+                  <a:srgbClr val="313135"/>
+                </a:solidFill>
+                <a:latin typeface="Arial Unicode MS"/>
+              </a:rPr>
+              <a:t>的端口</a:t>
+            </a:r>
+            <a:r>
+              <a:rPr lang="en-US" altLang="zh-CN" sz="1200" dirty="0" smtClean="0">
+                <a:solidFill>
+                  <a:srgbClr val="313135"/>
+                </a:solidFill>
+                <a:latin typeface="Arial Unicode MS"/>
+              </a:rPr>
+              <a:t>, 443</a:t>
+            </a:r>
+            <a:r>
+              <a:rPr lang="zh-CN" altLang="en-US" sz="1200" dirty="0" smtClean="0">
+                <a:solidFill>
+                  <a:srgbClr val="313135"/>
+                </a:solidFill>
+                <a:latin typeface="Arial Unicode MS"/>
+              </a:rPr>
+              <a:t>是</a:t>
+            </a:r>
+            <a:r>
+              <a:rPr lang="en-US" altLang="zh-CN" sz="1200" dirty="0" smtClean="0">
+                <a:solidFill>
+                  <a:srgbClr val="313135"/>
+                </a:solidFill>
+                <a:latin typeface="Arial Unicode MS"/>
+              </a:rPr>
+              <a:t>https</a:t>
+            </a:r>
+            <a:r>
+              <a:rPr lang="zh-CN" altLang="en-US" sz="1200" dirty="0" smtClean="0">
+                <a:solidFill>
+                  <a:srgbClr val="313135"/>
+                </a:solidFill>
+                <a:latin typeface="Arial Unicode MS"/>
+              </a:rPr>
+              <a:t>端口</a:t>
+            </a:r>
+            <a:endParaRPr lang="en-US" altLang="zh-CN" sz="1200" dirty="0" smtClean="0">
+              <a:solidFill>
+                <a:srgbClr val="313135"/>
+              </a:solidFill>
+              <a:latin typeface="Arial Unicode MS"/>
+            </a:endParaRPr>
+          </a:p>
+          <a:p>
+            <a:pPr marL="0" lvl="0" indent="0" eaLnBrk="0" fontAlgn="base" hangingPunct="0">
+              <a:lnSpc>
+                <a:spcPct val="100000"/>
+              </a:lnSpc>
+              <a:spcBef>
+                <a:spcPct val="0"/>
+              </a:spcBef>
+              <a:spcAft>
+                <a:spcPct val="0"/>
+              </a:spcAft>
+              <a:buNone/>
+            </a:pPr>
+            <a:r>
+              <a:rPr lang="en-US" altLang="zh-CN" dirty="0" smtClean="0"/>
+              <a:t>8080</a:t>
+            </a:r>
+            <a:r>
+              <a:rPr lang="zh-CN" altLang="en-US" dirty="0" smtClean="0"/>
+              <a:t>端口是用于</a:t>
+            </a:r>
+            <a:r>
+              <a:rPr lang="en-US" altLang="zh-CN" dirty="0" smtClean="0"/>
+              <a:t>WWW</a:t>
+            </a:r>
+            <a:r>
+              <a:rPr lang="zh-CN" altLang="en-US" dirty="0" smtClean="0"/>
+              <a:t>代劳服务</a:t>
+            </a:r>
+            <a:r>
+              <a:rPr lang="en-US" altLang="zh-CN" dirty="0" smtClean="0"/>
+              <a:t>,</a:t>
+            </a:r>
+            <a:endParaRPr kumimoji="0" lang="zh-CN" altLang="zh-CN" sz="2800" b="0" i="0" u="none" strike="noStrike" cap="none" normalizeH="0" baseline="0" dirty="0" smtClean="0">
+              <a:ln>
+                <a:noFill/>
+              </a:ln>
+              <a:solidFill>
+                <a:schemeClr val="tx1"/>
+              </a:solidFill>
+              <a:effectLst/>
+              <a:latin typeface="Arial" panose="020B0604020202020204" pitchFamily="34" charset="0"/>
+            </a:endParaRPr>
+          </a:p>
+          <a:p>
+            <a:r>
+              <a:rPr lang="zh-CN" altLang="en-US" dirty="0" smtClean="0"/>
+              <a:t>看这个</a:t>
+            </a:r>
+            <a:r>
+              <a:rPr lang="en-US" altLang="zh-CN" dirty="0" smtClean="0"/>
+              <a:t>post </a:t>
+            </a:r>
+            <a:endParaRPr lang="zh-CN" altLang="en-US" dirty="0"/>
+          </a:p>
+        </p:txBody>
+      </p:sp>
+      <p:sp>
+        <p:nvSpPr>
+          <p:cNvPr id="4" name="灯片编号占位符 3"/>
+          <p:cNvSpPr>
+            <a:spLocks noGrp="1"/>
+          </p:cNvSpPr>
+          <p:nvPr>
+            <p:ph type="sldNum" sz="quarter" idx="10"/>
+          </p:nvPr>
+        </p:nvSpPr>
+        <p:spPr/>
+        <p:txBody>
+          <a:bodyPr/>
+          <a:lstStyle/>
+          <a:p>
+            <a:fld id="{0B3D93B1-B6F8-47A3-AA63-01CB63EDF94B}" type="slidenum">
+              <a:rPr lang="zh-CN" altLang="en-US" smtClean="0"/>
+              <a:t>13</a:t>
+            </a:fld>
+            <a:endParaRPr lang="zh-CN" altLang="en-US"/>
+          </a:p>
+        </p:txBody>
+      </p:sp>
+    </p:spTree>
+    <p:extLst>
+      <p:ext uri="{BB962C8B-B14F-4D97-AF65-F5344CB8AC3E}">
+        <p14:creationId xmlns:p14="http://schemas.microsoft.com/office/powerpoint/2010/main" val="944223539"/>
+      </p:ext>
+    </p:extLst>
+  </p:cSld>
+  <p:clrMapOvr>
+    <a:masterClrMapping/>
+  </p:clrMapOvr>
+</p:notes>
+</file>
+
+<file path=ppt/notesSlides/notesSlide13.xml><?xml version="1.0" encoding="utf-8"?>
+<p:notes xmlns:a="http://schemas.openxmlformats.org/drawingml/2006/main" xmlns:r="http://schemas.openxmlformats.org/officeDocument/2006/relationships" xmlns:p="http://schemas.openxmlformats.org/presentationml/2006/main">
+  <p:cSld>
+    <p:spTree>
+      <p:nvGrpSpPr>
+        <p:cNvPr id="1" name=""/>
+        <p:cNvGrpSpPr/>
+        <p:nvPr/>
+      </p:nvGrpSpPr>
+      <p:grpSpPr>
+        <a:xfrm>
+          <a:off x="0" y="0"/>
+          <a:ext cx="0" cy="0"/>
+          <a:chOff x="0" y="0"/>
+          <a:chExt cx="0" cy="0"/>
+        </a:xfrm>
+      </p:grpSpPr>
+      <p:sp>
+        <p:nvSpPr>
+          <p:cNvPr id="2" name="幻灯片图像占位符 1"/>
+          <p:cNvSpPr>
+            <a:spLocks noGrp="1" noRot="1" noChangeAspect="1"/>
+          </p:cNvSpPr>
+          <p:nvPr>
+            <p:ph type="sldImg"/>
+          </p:nvPr>
+        </p:nvSpPr>
+        <p:spPr/>
+      </p:sp>
+      <p:sp>
+        <p:nvSpPr>
+          <p:cNvPr id="3" name="备注占位符 2"/>
+          <p:cNvSpPr>
+            <a:spLocks noGrp="1"/>
+          </p:cNvSpPr>
+          <p:nvPr>
+            <p:ph type="body" idx="1"/>
+          </p:nvPr>
+        </p:nvSpPr>
+        <p:spPr/>
+        <p:txBody>
+          <a:bodyPr/>
+          <a:lstStyle/>
+          <a:p>
+            <a:r>
+              <a:rPr lang="zh-CN" altLang="en-US" dirty="0" smtClean="0"/>
               <a:t>可以跟踪</a:t>
             </a:r>
             <a:r>
@@ -986,7 +1391,19 @@
             </a:r>
             <a:r>
               <a:rPr lang="en-US" altLang="zh-CN" baseline="0" dirty="0" smtClean="0"/>
-              <a:t>keep alive,   accept encoding </a:t>
+              <a:t>keep alive, </a:t>
+            </a:r>
+            <a:r>
+              <a:rPr lang="zh-CN" altLang="en-US" baseline="0" dirty="0" smtClean="0"/>
+              <a:t>就是发送请求后依旧保持连接</a:t>
+            </a:r>
+            <a:r>
+              <a:rPr lang="en-US" altLang="zh-CN" baseline="0" dirty="0" smtClean="0"/>
+              <a:t>,  </a:t>
+            </a:r>
+            <a:r>
+              <a:rPr lang="en-US" altLang="zh-CN" baseline="0" dirty="0" smtClean="0"/>
+              <a:t>accept encoding </a:t>
             </a:r>
             <a:r>
               <a:rPr lang="zh-CN" altLang="en-US" baseline="0" dirty="0" smtClean="0"/>
@@ -1046,7 +1463,7 @@
 </p:notes>
 </file>
 
-<file path=ppt/notesSlides/notesSlide12.xml><?xml version="1.0" encoding="utf-8"?>
+<file path=ppt/notesSlides/notesSlide14.xml><?xml version="1.0" encoding="utf-8"?>
 <p:notes xmlns:a="http://schemas.openxmlformats.org/drawingml/2006/main" xmlns:r="http://schemas.openxmlformats.org/officeDocument/2006/relationships" xmlns:p="http://schemas.openxmlformats.org/presentationml/2006/main">
   <p:cSld>
     <p:spTree>
@@ -1194,205 +1611,111 @@
           <a:bodyPr/>
           <a:lstStyle/>
           <a:p>
-            <a:pPr marL="0" marR="0" indent="0" algn="l" defTabSz="914400" rtl="0" eaLnBrk="1" fontAlgn="auto" latinLnBrk="0" hangingPunct="1">
-              <a:lnSpc>
-                <a:spcPct val="100000"/>
-              </a:lnSpc>
-              <a:spcBef>
-                <a:spcPts val="0"/>
-              </a:spcBef>
-              <a:spcAft>
-                <a:spcPts val="0"/>
-              </a:spcAft>
-              <a:buClrTx/>
-              <a:buSzTx/>
-              <a:buFontTx/>
-              <a:buNone/>
-              <a:tabLst/>
-              <a:defRPr/>
-            </a:pPr>
             <a:r>
               <a:rPr lang="zh-CN" altLang="en-US" dirty="0" smtClean="0"/>
-              <a:t>中间是详细信息</a:t>
+              <a:t>我们先来看一看界面</a:t>
             </a:r>
             <a:r>
               <a:rPr lang="en-US" altLang="zh-CN" dirty="0" smtClean="0"/>
               <a:t>, </a:t>
             </a:r>
             <a:r>
-              <a:rPr lang="en-US" altLang="zh-CN" sz="1200" b="0" i="0" kern="1200" dirty="0" smtClean="0">
-                <a:solidFill>
-                  <a:schemeClr val="tx1"/>
-                </a:solidFill>
-                <a:effectLst/>
-                <a:latin typeface="+mn-lt"/>
-                <a:ea typeface="+mn-ea"/>
-                <a:cs typeface="+mn-cs"/>
-              </a:rPr>
-              <a:t>Frame</a:t>
-            </a:r>
-            <a:r>
-              <a:rPr lang="zh-CN" altLang="en-US" sz="1200" b="0" i="0" kern="1200" dirty="0" smtClean="0">
-                <a:solidFill>
-                  <a:schemeClr val="tx1"/>
-                </a:solidFill>
-                <a:effectLst/>
-                <a:latin typeface="+mn-lt"/>
-                <a:ea typeface="+mn-ea"/>
-                <a:cs typeface="+mn-cs"/>
-              </a:rPr>
-              <a:t>：「物理层」数据帧情况。</a:t>
-            </a:r>
-            <a:r>
-              <a:rPr lang="en-US" altLang="zh-CN" sz="1200" b="0" i="0" kern="1200" dirty="0" smtClean="0">
-                <a:solidFill>
-                  <a:schemeClr val="tx1"/>
-                </a:solidFill>
-                <a:effectLst/>
-                <a:latin typeface="+mn-lt"/>
-                <a:ea typeface="+mn-ea"/>
-                <a:cs typeface="+mn-cs"/>
-              </a:rPr>
-              <a:t>Ethernet</a:t>
-            </a:r>
-            <a:r>
-              <a:rPr lang="zh-CN" altLang="en-US" sz="1200" b="0" i="0" kern="1200" dirty="0" smtClean="0">
-                <a:solidFill>
-                  <a:schemeClr val="tx1"/>
-                </a:solidFill>
-                <a:effectLst/>
-                <a:latin typeface="+mn-lt"/>
-                <a:ea typeface="+mn-ea"/>
-                <a:cs typeface="+mn-cs"/>
-              </a:rPr>
-              <a:t>：「数据链路层」以太网头部信息。</a:t>
-            </a:r>
-          </a:p>
-          <a:p>
-            <a:pPr marL="0" marR="0" indent="0" algn="l" defTabSz="914400" rtl="0" eaLnBrk="1" fontAlgn="auto" latinLnBrk="0" hangingPunct="1">
-              <a:lnSpc>
-                <a:spcPct val="100000"/>
-              </a:lnSpc>
-              <a:spcBef>
-                <a:spcPts val="0"/>
-              </a:spcBef>
-              <a:spcAft>
-                <a:spcPts val="0"/>
-              </a:spcAft>
-              <a:buClrTx/>
-              <a:buSzTx/>
-              <a:buFontTx/>
-              <a:buNone/>
-              <a:tabLst/>
-              <a:defRPr/>
-            </a:pPr>
-            <a:r>
-              <a:rPr lang="en-US" altLang="zh-CN" sz="1200" b="0" i="0" kern="1200" dirty="0" smtClean="0">
-                <a:solidFill>
-                  <a:schemeClr val="tx1"/>
-                </a:solidFill>
-                <a:effectLst/>
-                <a:latin typeface="+mn-lt"/>
-                <a:ea typeface="+mn-ea"/>
-                <a:cs typeface="+mn-cs"/>
-              </a:rPr>
-              <a:t>Internet Protocol Version 4</a:t>
-            </a:r>
-            <a:r>
-              <a:rPr lang="zh-CN" altLang="en-US" sz="1200" b="0" i="0" kern="1200" dirty="0" smtClean="0">
-                <a:solidFill>
-                  <a:schemeClr val="tx1"/>
-                </a:solidFill>
-                <a:effectLst/>
-                <a:latin typeface="+mn-lt"/>
-                <a:ea typeface="+mn-ea"/>
-                <a:cs typeface="+mn-cs"/>
-              </a:rPr>
-              <a:t>：「网络层」数据包头部信息</a:t>
+              <a:rPr lang="zh-CN" altLang="en-US" dirty="0" smtClean="0"/>
+              <a:t>这</a:t>
+            </a:r>
+            <a:r>
+              <a:rPr lang="zh-CN" altLang="en-US" dirty="0" smtClean="0"/>
+              <a:t>是我选择了</a:t>
+            </a:r>
+            <a:r>
+              <a:rPr lang="en-US" altLang="zh-CN" dirty="0" err="1" smtClean="0"/>
+              <a:t>wlan</a:t>
+            </a:r>
+            <a:r>
+              <a:rPr lang="zh-CN" altLang="en-US" dirty="0" smtClean="0"/>
+              <a:t>抓包的界面</a:t>
             </a:r>
             <a:r>
               <a:rPr lang="en-US" altLang="zh-CN" dirty="0" smtClean="0"/>
-              <a:t>, IP</a:t>
+              <a:t>, </a:t>
+            </a:r>
+            <a:r>
+              <a:rPr lang="en-US" altLang="zh-CN" dirty="0" err="1" smtClean="0"/>
+              <a:t>wireshark</a:t>
             </a:r>
             <a:r>
               <a:rPr lang="zh-CN" altLang="en-US" dirty="0" smtClean="0"/>
-              <a:t>用了</a:t>
+              <a:t>这个软件好像还在更新</a:t>
             </a:r>
             <a:r>
               <a:rPr lang="en-US" altLang="zh-CN" dirty="0" smtClean="0"/>
-              <a:t>IPV4.</a:t>
-            </a:r>
-            <a:r>
-              <a:rPr lang="en-US" altLang="zh-CN" sz="1200" b="0" i="0" kern="1200" dirty="0" smtClean="0">
-                <a:solidFill>
-                  <a:schemeClr val="tx1"/>
-                </a:solidFill>
-                <a:effectLst/>
-                <a:latin typeface="+mn-lt"/>
-                <a:ea typeface="+mn-ea"/>
-                <a:cs typeface="+mn-cs"/>
-              </a:rPr>
-              <a:t> Transmission Control Protocol</a:t>
-            </a:r>
-            <a:r>
-              <a:rPr lang="zh-CN" altLang="en-US" sz="1200" b="0" i="0" kern="1200" dirty="0" smtClean="0">
-                <a:solidFill>
-                  <a:schemeClr val="tx1"/>
-                </a:solidFill>
-                <a:effectLst/>
-                <a:latin typeface="+mn-lt"/>
-                <a:ea typeface="+mn-ea"/>
-                <a:cs typeface="+mn-cs"/>
-              </a:rPr>
-              <a:t>：「传输层」数据段头部信息。</a:t>
+              <a:t>, UI</a:t>
             </a:r>
             <a:r>
               <a:rPr lang="zh-CN" altLang="en-US" dirty="0" smtClean="0"/>
-              <a:t>可以看到</a:t>
+              <a:t>做的也是很不错</a:t>
             </a:r>
             <a:r>
               <a:rPr lang="en-US" altLang="zh-CN" dirty="0" smtClean="0"/>
-              <a:t>TCP</a:t>
+              <a:t>, </a:t>
             </a:r>
             <a:r>
               <a:rPr lang="zh-CN" altLang="en-US" dirty="0" smtClean="0"/>
-              <a:t>层的端口号以及</a:t>
+              <a:t>我们可以看到显示了编号</a:t>
             </a:r>
             <a:r>
               <a:rPr lang="en-US" altLang="zh-CN" dirty="0" smtClean="0"/>
-              <a:t>seq1 </a:t>
+              <a:t>, </a:t>
             </a:r>
             <a:r>
               <a:rPr lang="zh-CN" altLang="en-US" dirty="0" smtClean="0"/>
-              <a:t>确认号</a:t>
+              <a:t>时间</a:t>
             </a:r>
             <a:r>
               <a:rPr lang="en-US" altLang="zh-CN" dirty="0" smtClean="0"/>
-              <a:t>ack1, </a:t>
-            </a:r>
-          </a:p>
-          <a:p>
-            <a:r>
-              <a:rPr lang="zh-CN" altLang="en-US" sz="1200" b="0" i="0" kern="1200" dirty="0" smtClean="0">
-                <a:solidFill>
-                  <a:schemeClr val="tx1"/>
-                </a:solidFill>
-                <a:effectLst/>
-                <a:latin typeface="+mn-lt"/>
-                <a:ea typeface="+mn-ea"/>
-                <a:cs typeface="+mn-cs"/>
-              </a:rPr>
-              <a:t>可以发现，一些行文字的底色不同。不同报文采用不同的颜色来区分。</a:t>
-            </a:r>
-            <a:endParaRPr lang="en-US" altLang="zh-CN" sz="1200" b="0" i="0" kern="1200" dirty="0" smtClean="0">
-              <a:solidFill>
-                <a:schemeClr val="tx1"/>
-              </a:solidFill>
-              <a:effectLst/>
-              <a:latin typeface="+mn-lt"/>
-              <a:ea typeface="+mn-ea"/>
-              <a:cs typeface="+mn-cs"/>
-            </a:endParaRPr>
+              <a:t>, </a:t>
+            </a:r>
+            <a:r>
+              <a:rPr lang="zh-CN" altLang="en-US" dirty="0" smtClean="0"/>
+              <a:t>源地址</a:t>
+            </a:r>
+            <a:r>
+              <a:rPr lang="en-US" altLang="zh-CN" dirty="0" smtClean="0"/>
+              <a:t>, </a:t>
+            </a:r>
+            <a:r>
+              <a:rPr lang="zh-CN" altLang="en-US" dirty="0" smtClean="0"/>
+              <a:t>目标地址</a:t>
+            </a:r>
+            <a:r>
+              <a:rPr lang="en-US" altLang="zh-CN" dirty="0" smtClean="0"/>
+              <a:t>, </a:t>
+            </a:r>
+            <a:r>
+              <a:rPr lang="zh-CN" altLang="en-US" dirty="0" smtClean="0"/>
+              <a:t>协议</a:t>
+            </a:r>
+            <a:r>
+              <a:rPr lang="en-US" altLang="zh-CN" dirty="0" smtClean="0"/>
+              <a:t>, </a:t>
+            </a:r>
+            <a:r>
+              <a:rPr lang="zh-CN" altLang="en-US" dirty="0" smtClean="0"/>
+              <a:t>长度</a:t>
+            </a:r>
+            <a:r>
+              <a:rPr lang="en-US" altLang="zh-CN" dirty="0" smtClean="0"/>
+              <a:t>,</a:t>
+            </a:r>
+            <a:r>
+              <a:rPr lang="zh-CN" altLang="en-US" dirty="0" smtClean="0"/>
+              <a:t>封包信息</a:t>
+            </a:r>
+            <a:r>
+              <a:rPr lang="en-US" altLang="zh-CN" dirty="0" smtClean="0"/>
+              <a:t>.</a:t>
+            </a:r>
+            <a:endParaRPr lang="zh-CN" altLang="en-US" dirty="0"/>
           </a:p>
         </p:txBody>
       </p:sp>
@@ -1413,7 +1736,7 @@
           <a:p>
             <a:fld id="{0B3D93B1-B6F8-47A3-AA63-01CB63EDF94B}" type="slidenum">
               <a:rPr lang="zh-CN" altLang="en-US" smtClean="0"/>
-              <a:t>3</a:t>
+              <a:t>2</a:t>
             </a:fld>
             <a:endParaRPr lang="zh-CN" altLang="en-US"/>
           </a:p>
@@ -1422,7 +1745,7 @@
     </p:spTree>
     <p:extLst>
       <p:ext uri="{BB962C8B-B14F-4D97-AF65-F5344CB8AC3E}">
-        <p14:creationId xmlns:p14="http://schemas.microsoft.com/office/powerpoint/2010/main" val="161236622"/>
+        <p14:creationId xmlns:p14="http://schemas.microsoft.com/office/powerpoint/2010/main" val="2891931892"/>
       </p:ext>
     </p:extLst>
   </p:cSld>
@@ -1476,35 +1799,205 @@
           <a:bodyPr/>
           <a:lstStyle/>
           <a:p>
+            <a:pPr marL="0" marR="0" indent="0" algn="l" defTabSz="914400" rtl="0" eaLnBrk="1" fontAlgn="auto" latinLnBrk="0" hangingPunct="1">
+              <a:lnSpc>
+                <a:spcPct val="100000"/>
+              </a:lnSpc>
+              <a:spcBef>
+                <a:spcPts val="0"/>
+              </a:spcBef>
+              <a:spcAft>
+                <a:spcPts val="0"/>
+              </a:spcAft>
+              <a:buClrTx/>
+              <a:buSzTx/>
+              <a:buFontTx/>
+              <a:buNone/>
+              <a:tabLst/>
+              <a:defRPr/>
+            </a:pPr>
             <a:r>
               <a:rPr lang="zh-CN" altLang="en-US" dirty="0" smtClean="0"/>
-              <a:t>我们可以看到以太网的</a:t>
-            </a:r>
-            <a:r>
-              <a:rPr lang="en-US" altLang="zh-CN" dirty="0" err="1" smtClean="0"/>
-              <a:t>arp</a:t>
+              <a:t>中间是详细信息</a:t>
+            </a:r>
+            <a:r>
+              <a:rPr lang="en-US" altLang="zh-CN" dirty="0" smtClean="0"/>
+              <a:t>, </a:t>
+            </a:r>
+            <a:r>
+              <a:rPr lang="en-US" altLang="zh-CN" sz="1200" b="0" i="0" kern="1200" dirty="0" smtClean="0">
+                <a:solidFill>
+                  <a:schemeClr val="tx1"/>
+                </a:solidFill>
+                <a:effectLst/>
+                <a:latin typeface="+mn-lt"/>
+                <a:ea typeface="+mn-ea"/>
+                <a:cs typeface="+mn-cs"/>
+              </a:rPr>
+              <a:t>Frame</a:t>
+            </a:r>
+            <a:r>
+              <a:rPr lang="zh-CN" altLang="en-US" sz="1200" b="0" i="0" kern="1200" dirty="0" smtClean="0">
+                <a:solidFill>
+                  <a:schemeClr val="tx1"/>
+                </a:solidFill>
+                <a:effectLst/>
+                <a:latin typeface="+mn-lt"/>
+                <a:ea typeface="+mn-ea"/>
+                <a:cs typeface="+mn-cs"/>
+              </a:rPr>
+              <a:t>：「物理层」数据帧情况。</a:t>
+            </a:r>
+            <a:r>
+              <a:rPr lang="en-US" altLang="zh-CN" sz="1200" b="0" i="0" kern="1200" dirty="0" smtClean="0">
+                <a:solidFill>
+                  <a:schemeClr val="tx1"/>
+                </a:solidFill>
+                <a:effectLst/>
+                <a:latin typeface="+mn-lt"/>
+                <a:ea typeface="+mn-ea"/>
+                <a:cs typeface="+mn-cs"/>
+              </a:rPr>
+              <a:t>Ethernet</a:t>
+            </a:r>
+            <a:r>
+              <a:rPr lang="zh-CN" altLang="en-US" sz="1200" b="0" i="0" kern="1200" dirty="0" smtClean="0">
+                <a:solidFill>
+                  <a:schemeClr val="tx1"/>
+                </a:solidFill>
+                <a:effectLst/>
+                <a:latin typeface="+mn-lt"/>
+                <a:ea typeface="+mn-ea"/>
+                <a:cs typeface="+mn-cs"/>
+              </a:rPr>
+              <a:t>：「数据链路层」以太网头部信息。</a:t>
+            </a:r>
+          </a:p>
+          <a:p>
+            <a:pPr marL="0" marR="0" indent="0" algn="l" defTabSz="914400" rtl="0" eaLnBrk="1" fontAlgn="auto" latinLnBrk="0" hangingPunct="1">
+              <a:lnSpc>
+                <a:spcPct val="100000"/>
+              </a:lnSpc>
+              <a:spcBef>
+                <a:spcPts val="0"/>
+              </a:spcBef>
+              <a:spcAft>
+                <a:spcPts val="0"/>
+              </a:spcAft>
+              <a:buClrTx/>
+              <a:buSzTx/>
+              <a:buFontTx/>
+              <a:buNone/>
+              <a:tabLst/>
+              <a:defRPr/>
+            </a:pPr>
+            <a:r>
+              <a:rPr lang="en-US" altLang="zh-CN" sz="1200" b="0" i="0" kern="1200" dirty="0" smtClean="0">
+                <a:solidFill>
+                  <a:schemeClr val="tx1"/>
+                </a:solidFill>
+                <a:effectLst/>
+                <a:latin typeface="+mn-lt"/>
+                <a:ea typeface="+mn-ea"/>
+                <a:cs typeface="+mn-cs"/>
+              </a:rPr>
+              <a:t>Internet Protocol Version 4</a:t>
+            </a:r>
+            <a:r>
+              <a:rPr lang="zh-CN" altLang="en-US" sz="1200" b="0" i="0" kern="1200" dirty="0" smtClean="0">
+                <a:solidFill>
+                  <a:schemeClr val="tx1"/>
+                </a:solidFill>
+                <a:effectLst/>
+                <a:latin typeface="+mn-lt"/>
+                <a:ea typeface="+mn-ea"/>
+                <a:cs typeface="+mn-cs"/>
+              </a:rPr>
+              <a:t>：「网络层」数据包头部信息</a:t>
+            </a:r>
+            <a:r>
+              <a:rPr lang="en-US" altLang="zh-CN" dirty="0" smtClean="0"/>
+              <a:t>, IP</a:t>
             </a:r>
             <a:r>
               <a:rPr lang="zh-CN" altLang="en-US" dirty="0" smtClean="0"/>
-              <a:t>请求</a:t>
+              <a:t>用了</a:t>
             </a:r>
             <a:r>
               <a:rPr lang="en-US" altLang="zh-CN" dirty="0" smtClean="0"/>
-              <a:t>,</a:t>
+              <a:t>IPV4.</a:t>
+            </a:r>
+            <a:r>
+              <a:rPr lang="en-US" altLang="zh-CN" sz="1200" b="0" i="0" kern="1200" dirty="0" smtClean="0">
+                <a:solidFill>
+                  <a:schemeClr val="tx1"/>
+                </a:solidFill>
+                <a:effectLst/>
+                <a:latin typeface="+mn-lt"/>
+                <a:ea typeface="+mn-ea"/>
+                <a:cs typeface="+mn-cs"/>
+              </a:rPr>
+              <a:t> Transmission Control Protocol</a:t>
+            </a:r>
+            <a:r>
+              <a:rPr lang="zh-CN" altLang="en-US" sz="1200" b="0" i="0" kern="1200" dirty="0" smtClean="0">
+                <a:solidFill>
+                  <a:schemeClr val="tx1"/>
+                </a:solidFill>
+                <a:effectLst/>
+                <a:latin typeface="+mn-lt"/>
+                <a:ea typeface="+mn-ea"/>
+                <a:cs typeface="+mn-cs"/>
+              </a:rPr>
+              <a:t>：「传输层」数据段头部信息。</a:t>
             </a:r>
             <a:r>
               <a:rPr lang="zh-CN" altLang="en-US" dirty="0" smtClean="0"/>
-              <a:t> 目的端</a:t>
+              <a:t>可以看到</a:t>
             </a:r>
             <a:r>
               <a:rPr lang="en-US" altLang="zh-CN" dirty="0" smtClean="0"/>
-              <a:t>,  </a:t>
+              <a:t>TCP</a:t>
             </a:r>
             <a:r>
               <a:rPr lang="zh-CN" altLang="en-US" dirty="0" smtClean="0"/>
-              <a:t>发送端</a:t>
-            </a:r>
-            <a:endParaRPr lang="zh-CN" altLang="en-US" dirty="0"/>
+              <a:t>层的端口号以及</a:t>
+            </a:r>
+            <a:r>
+              <a:rPr lang="en-US" altLang="zh-CN" dirty="0" smtClean="0"/>
+              <a:t>seq1 </a:t>
+            </a:r>
+            <a:r>
+              <a:rPr lang="zh-CN" altLang="en-US" dirty="0" smtClean="0"/>
+              <a:t>确认号</a:t>
+            </a:r>
+            <a:r>
+              <a:rPr lang="en-US" altLang="zh-CN" dirty="0" smtClean="0"/>
+              <a:t>ack1, </a:t>
+            </a:r>
+          </a:p>
+          <a:p>
+            <a:r>
+              <a:rPr lang="zh-CN" altLang="en-US" sz="1200" b="0" i="0" kern="1200" dirty="0" smtClean="0">
+                <a:solidFill>
+                  <a:schemeClr val="tx1"/>
+                </a:solidFill>
+                <a:effectLst/>
+                <a:latin typeface="+mn-lt"/>
+                <a:ea typeface="+mn-ea"/>
+                <a:cs typeface="+mn-cs"/>
+              </a:rPr>
+              <a:t>可以发现，一些行文字的底色不同。不同报文采用不同的颜色来区分。</a:t>
+            </a:r>
+            <a:endParaRPr lang="en-US" altLang="zh-CN" sz="1200" b="0" i="0" kern="1200" dirty="0" smtClean="0">
+              <a:solidFill>
+                <a:schemeClr val="tx1"/>
+              </a:solidFill>
+              <a:effectLst/>
+              <a:latin typeface="+mn-lt"/>
+              <a:ea typeface="+mn-ea"/>
+              <a:cs typeface="+mn-cs"/>
+            </a:endParaRPr>
           </a:p>
         </p:txBody>
       </p:sp>
@@ -1525,7 +2018,7 @@
           <a:p>
             <a:fld id="{0B3D93B1-B6F8-47A3-AA63-01CB63EDF94B}" type="slidenum">
               <a:rPr lang="zh-CN" altLang="en-US" smtClean="0"/>
-              <a:t>5</a:t>
+              <a:t>3</a:t>
             </a:fld>
             <a:endParaRPr lang="zh-CN" altLang="en-US"/>
           </a:p>
@@ -1534,7 +2027,7 @@
     </p:spTree>
     <p:extLst>
       <p:ext uri="{BB962C8B-B14F-4D97-AF65-F5344CB8AC3E}">
-        <p14:creationId xmlns:p14="http://schemas.microsoft.com/office/powerpoint/2010/main" val="2894307380"/>
+        <p14:creationId xmlns:p14="http://schemas.microsoft.com/office/powerpoint/2010/main" val="161236622"/>
       </p:ext>
     </p:extLst>
   </p:cSld>
@@ -1590,95 +2083,15 @@
           <a:p>
             <a:r>
               <a:rPr lang="zh-CN" altLang="en-US" dirty="0" smtClean="0"/>
-              <a:t>可以看到操作类型</a:t>
-            </a:r>
-            <a:r>
-              <a:rPr lang="en-US" altLang="zh-CN" dirty="0" smtClean="0"/>
-              <a:t>, 1</a:t>
+              <a:t>我们可以看到以太网的</a:t>
+            </a:r>
+            <a:r>
+              <a:rPr lang="en-US" altLang="zh-CN" dirty="0" err="1" smtClean="0"/>
+              <a:t>arp</a:t>
             </a:r>
             <a:r>
               <a:rPr lang="zh-CN" altLang="en-US" dirty="0" smtClean="0"/>
-              <a:t>代表请求</a:t>
-            </a:r>
-            <a:r>
-              <a:rPr lang="en-US" altLang="zh-CN" dirty="0" smtClean="0"/>
-              <a:t>2</a:t>
-            </a:r>
-            <a:r>
-              <a:rPr lang="zh-CN" altLang="en-US" dirty="0" smtClean="0"/>
-              <a:t>代表响应</a:t>
-            </a:r>
-            <a:r>
-              <a:rPr lang="en-US" altLang="zh-CN" dirty="0" smtClean="0"/>
-              <a:t>, </a:t>
-            </a:r>
-            <a:r>
-              <a:rPr lang="zh-CN" altLang="en-US" dirty="0" smtClean="0"/>
-              <a:t>他是一个广播</a:t>
-            </a:r>
-            <a:r>
-              <a:rPr lang="en-US" altLang="zh-CN" dirty="0" smtClean="0"/>
-              <a:t>, </a:t>
-            </a:r>
-            <a:r>
-              <a:rPr lang="zh-CN" altLang="en-US" dirty="0" smtClean="0"/>
-              <a:t>所以</a:t>
-            </a:r>
-            <a:r>
-              <a:rPr lang="en-US" altLang="zh-CN" dirty="0" smtClean="0"/>
-              <a:t>mac</a:t>
-            </a:r>
-            <a:r>
-              <a:rPr lang="zh-CN" altLang="en-US" dirty="0" smtClean="0"/>
-              <a:t>地址为全</a:t>
-            </a:r>
-            <a:r>
-              <a:rPr lang="en-US" altLang="zh-CN" dirty="0" smtClean="0"/>
-              <a:t>0 .</a:t>
-            </a:r>
-            <a:r>
-              <a:rPr lang="zh-CN" altLang="en-US" dirty="0" smtClean="0"/>
-              <a:t>就是发送给所有</a:t>
-            </a:r>
-            <a:r>
-              <a:rPr lang="en-US" altLang="zh-CN" dirty="0" err="1" smtClean="0"/>
-              <a:t>ip</a:t>
-            </a:r>
-            <a:r>
-              <a:rPr lang="zh-CN" altLang="en-US" dirty="0" smtClean="0"/>
-              <a:t>地址</a:t>
-            </a:r>
-            <a:r>
-              <a:rPr lang="en-US" altLang="zh-CN" dirty="0" smtClean="0"/>
-              <a:t>. </a:t>
-            </a:r>
-            <a:r>
-              <a:rPr lang="zh-CN" altLang="en-US" dirty="0" smtClean="0"/>
-              <a:t>想知道</a:t>
-            </a:r>
-            <a:r>
-              <a:rPr lang="en-US" altLang="zh-CN" dirty="0" smtClean="0"/>
-              <a:t>target </a:t>
-            </a:r>
-            <a:r>
-              <a:rPr lang="en-US" altLang="zh-CN" dirty="0" err="1" smtClean="0"/>
-              <a:t>ip</a:t>
-            </a:r>
-            <a:r>
-              <a:rPr lang="zh-CN" altLang="en-US" dirty="0" smtClean="0"/>
-              <a:t>地址对应的硬件地址</a:t>
-            </a:r>
-            <a:r>
-              <a:rPr lang="en-US" altLang="zh-CN" dirty="0" smtClean="0"/>
-              <a:t>, target </a:t>
-            </a:r>
-            <a:r>
-              <a:rPr lang="en-US" altLang="zh-CN" dirty="0" err="1" smtClean="0"/>
-              <a:t>ip</a:t>
-            </a:r>
-            <a:r>
-              <a:rPr lang="zh-CN" altLang="en-US" dirty="0" smtClean="0"/>
-              <a:t>地址收到了之后就会响应</a:t>
+              <a:t>请求</a:t>
             </a:r>
             <a:r>
               <a:rPr lang="en-US" altLang="zh-CN" dirty="0" smtClean="0"/>
@@ -1686,11 +2099,15 @@
             </a:r>
             <a:r>
               <a:rPr lang="zh-CN" altLang="en-US" dirty="0" smtClean="0"/>
-              <a:t>把自己的硬件地址发送过去</a:t>
+              <a:t> 目的端</a:t>
             </a:r>
             <a:r>
               <a:rPr lang="en-US" altLang="zh-CN" dirty="0" smtClean="0"/>
-              <a:t>.</a:t>
+              <a:t>,  </a:t>
+            </a:r>
+            <a:r>
+              <a:rPr lang="zh-CN" altLang="en-US" dirty="0" smtClean="0"/>
+              <a:t>发送端</a:t>
             </a:r>
             <a:endParaRPr lang="zh-CN" altLang="en-US" dirty="0"/>
           </a:p>
@@ -1713,7 +2130,7 @@
           <a:p>
             <a:fld id="{0B3D93B1-B6F8-47A3-AA63-01CB63EDF94B}" type="slidenum">
               <a:rPr lang="zh-CN" altLang="en-US" smtClean="0"/>
-              <a:t>6</a:t>
+              <a:t>5</a:t>
             </a:fld>
             <a:endParaRPr lang="zh-CN" altLang="en-US"/>
           </a:p>
@@ -1722,7 +2139,7 @@
     </p:spTree>
     <p:extLst>
       <p:ext uri="{BB962C8B-B14F-4D97-AF65-F5344CB8AC3E}">
-        <p14:creationId xmlns:p14="http://schemas.microsoft.com/office/powerpoint/2010/main" val="1983923454"/>
+        <p14:creationId xmlns:p14="http://schemas.microsoft.com/office/powerpoint/2010/main" val="2894307380"/>
       </p:ext>
     </p:extLst>
   </p:cSld>
@@ -1777,64 +2194,108 @@
           <a:lstStyle/>
           <a:p>
             <a:r>
-              <a:rPr lang="zh-CN" altLang="en-US" sz="1200" b="0" i="0" kern="1200" dirty="0" smtClean="0">
-                <a:solidFill>
-                  <a:schemeClr val="tx1"/>
-                </a:solidFill>
-                <a:effectLst/>
-                <a:latin typeface="+mn-lt"/>
-                <a:ea typeface="+mn-ea"/>
-                <a:cs typeface="+mn-cs"/>
-              </a:rPr>
-              <a:t>在 </a:t>
-            </a:r>
-            <a:r>
-              <a:rPr lang="en-US" altLang="zh-CN" sz="1200" b="0" i="0" kern="1200" dirty="0" smtClean="0">
-                <a:solidFill>
-                  <a:schemeClr val="tx1"/>
-                </a:solidFill>
-                <a:effectLst/>
-                <a:latin typeface="+mn-lt"/>
-                <a:ea typeface="+mn-ea"/>
-                <a:cs typeface="+mn-cs"/>
-              </a:rPr>
-              <a:t>Wireshark </a:t>
-            </a:r>
-            <a:r>
-              <a:rPr lang="zh-CN" altLang="en-US" sz="1200" b="0" i="0" kern="1200" dirty="0" smtClean="0">
-                <a:solidFill>
-                  <a:schemeClr val="tx1"/>
-                </a:solidFill>
-                <a:effectLst/>
-                <a:latin typeface="+mn-lt"/>
-                <a:ea typeface="+mn-ea"/>
-                <a:cs typeface="+mn-cs"/>
-              </a:rPr>
-              <a:t>中，我们可以看到一共抓取了 </a:t>
-            </a:r>
-            <a:r>
-              <a:rPr lang="en-US" altLang="zh-CN" sz="1200" b="0" i="0" kern="1200" dirty="0" smtClean="0">
-                <a:solidFill>
-                  <a:schemeClr val="tx1"/>
-                </a:solidFill>
-                <a:effectLst/>
-                <a:latin typeface="+mn-lt"/>
-                <a:ea typeface="+mn-ea"/>
-                <a:cs typeface="+mn-cs"/>
-              </a:rPr>
-              <a:t>8 </a:t>
-            </a:r>
-            <a:r>
-              <a:rPr lang="zh-CN" altLang="en-US" sz="1200" b="0" i="0" kern="1200" dirty="0" smtClean="0">
-                <a:solidFill>
-                  <a:schemeClr val="tx1"/>
-                </a:solidFill>
-                <a:effectLst/>
-                <a:latin typeface="+mn-lt"/>
-                <a:ea typeface="+mn-ea"/>
-                <a:cs typeface="+mn-cs"/>
-              </a:rPr>
-              <a:t>个数据包，与命令行显示的数量一致，分别为双方的请求与应答。</a:t>
+              <a:rPr lang="zh-CN" altLang="en-US" dirty="0" smtClean="0"/>
+              <a:t>可以看到操作类型</a:t>
+            </a:r>
+            <a:r>
+              <a:rPr lang="en-US" altLang="zh-CN" dirty="0" smtClean="0"/>
+              <a:t>, 1</a:t>
+            </a:r>
+            <a:r>
+              <a:rPr lang="zh-CN" altLang="en-US" dirty="0" smtClean="0"/>
+              <a:t>代表请求</a:t>
+            </a:r>
+            <a:r>
+              <a:rPr lang="en-US" altLang="zh-CN" dirty="0" smtClean="0"/>
+              <a:t>2</a:t>
+            </a:r>
+            <a:r>
+              <a:rPr lang="zh-CN" altLang="en-US" dirty="0" smtClean="0"/>
+              <a:t>代表响应</a:t>
+            </a:r>
+            <a:r>
+              <a:rPr lang="en-US" altLang="zh-CN" dirty="0" smtClean="0"/>
+              <a:t>, </a:t>
+            </a:r>
+            <a:r>
+              <a:rPr lang="zh-CN" altLang="en-US" dirty="0" smtClean="0"/>
+              <a:t>他是一个广播</a:t>
+            </a:r>
+            <a:r>
+              <a:rPr lang="en-US" altLang="zh-CN" dirty="0" smtClean="0"/>
+              <a:t>, </a:t>
+            </a:r>
+            <a:r>
+              <a:rPr lang="zh-CN" altLang="en-US" dirty="0" smtClean="0"/>
+              <a:t>所以</a:t>
+            </a:r>
+            <a:r>
+              <a:rPr lang="en-US" altLang="zh-CN" dirty="0" smtClean="0"/>
+              <a:t>mac</a:t>
+            </a:r>
+            <a:r>
+              <a:rPr lang="zh-CN" altLang="en-US" dirty="0" smtClean="0"/>
+              <a:t>地址为全</a:t>
+            </a:r>
+            <a:r>
+              <a:rPr lang="en-US" altLang="zh-CN" dirty="0" smtClean="0"/>
+              <a:t>0 .</a:t>
+            </a:r>
+            <a:r>
+              <a:rPr lang="zh-CN" altLang="en-US" dirty="0" smtClean="0"/>
+              <a:t>就是发送给所有</a:t>
+            </a:r>
+            <a:r>
+              <a:rPr lang="en-US" altLang="zh-CN" dirty="0" err="1" smtClean="0"/>
+              <a:t>ip</a:t>
+            </a:r>
+            <a:r>
+              <a:rPr lang="zh-CN" altLang="en-US" dirty="0" smtClean="0"/>
+              <a:t>地址</a:t>
+            </a:r>
+            <a:r>
+              <a:rPr lang="en-US" altLang="zh-CN" dirty="0" smtClean="0"/>
+              <a:t>. </a:t>
+            </a:r>
+            <a:r>
+              <a:rPr lang="zh-CN" altLang="en-US" dirty="0" smtClean="0"/>
+              <a:t>想知道</a:t>
+            </a:r>
+            <a:r>
+              <a:rPr lang="en-US" altLang="zh-CN" dirty="0" smtClean="0"/>
+              <a:t>target </a:t>
+            </a:r>
+            <a:r>
+              <a:rPr lang="en-US" altLang="zh-CN" dirty="0" err="1" smtClean="0"/>
+              <a:t>ip</a:t>
+            </a:r>
+            <a:r>
+              <a:rPr lang="zh-CN" altLang="en-US" dirty="0" smtClean="0"/>
+              <a:t>地址对应的硬件地址</a:t>
+            </a:r>
+            <a:r>
+              <a:rPr lang="en-US" altLang="zh-CN" dirty="0" smtClean="0"/>
+              <a:t>, target </a:t>
+            </a:r>
+            <a:r>
+              <a:rPr lang="en-US" altLang="zh-CN" dirty="0" err="1" smtClean="0"/>
+              <a:t>ip</a:t>
+            </a:r>
+            <a:r>
+              <a:rPr lang="zh-CN" altLang="en-US" dirty="0" smtClean="0"/>
+              <a:t>地址收到了之后就会响应</a:t>
+            </a:r>
+            <a:r>
+              <a:rPr lang="en-US" altLang="zh-CN" dirty="0" smtClean="0"/>
+              <a:t>,</a:t>
+            </a:r>
+            <a:r>
+              <a:rPr lang="zh-CN" altLang="en-US" dirty="0" smtClean="0"/>
+              <a:t>把自己的硬件地址发送过去</a:t>
+            </a:r>
+            <a:r>
+              <a:rPr lang="en-US" altLang="zh-CN" dirty="0" smtClean="0"/>
+              <a:t>.</a:t>
             </a:r>
             <a:endParaRPr lang="zh-CN" altLang="en-US" dirty="0"/>
           </a:p>
@@ -1857,7 +2318,7 @@
           <a:p>
             <a:fld id="{0B3D93B1-B6F8-47A3-AA63-01CB63EDF94B}" type="slidenum">
               <a:rPr lang="zh-CN" altLang="en-US" smtClean="0"/>
-              <a:t>8</a:t>
+              <a:t>6</a:t>
             </a:fld>
             <a:endParaRPr lang="zh-CN" altLang="en-US"/>
           </a:p>
@@ -1866,7 +2327,7 @@
     </p:spTree>
     <p:extLst>
       <p:ext uri="{BB962C8B-B14F-4D97-AF65-F5344CB8AC3E}">
-        <p14:creationId xmlns:p14="http://schemas.microsoft.com/office/powerpoint/2010/main" val="3463599954"/>
+        <p14:creationId xmlns:p14="http://schemas.microsoft.com/office/powerpoint/2010/main" val="1983923454"/>
       </p:ext>
     </p:extLst>
   </p:cSld>
@@ -1922,87 +2383,23 @@
           <a:p>
             <a:r>
               <a:rPr lang="zh-CN" altLang="en-US" dirty="0" smtClean="0"/>
-              <a:t>看到</a:t>
-            </a:r>
-            <a:r>
-              <a:rPr lang="en-US" altLang="zh-CN" dirty="0" err="1" smtClean="0"/>
-              <a:t>ip</a:t>
-            </a:r>
-            <a:r>
-              <a:rPr lang="en-US" altLang="zh-CN" dirty="0" smtClean="0"/>
-              <a:t> </a:t>
-            </a:r>
-            <a:r>
-              <a:rPr lang="zh-CN" altLang="en-US" dirty="0" smtClean="0"/>
-              <a:t>版本号</a:t>
-            </a:r>
-            <a:r>
-              <a:rPr lang="en-US" altLang="zh-CN" dirty="0" smtClean="0"/>
-              <a:t>, </a:t>
-            </a:r>
-            <a:r>
-              <a:rPr lang="en-US" altLang="zh-CN" dirty="0" err="1" smtClean="0"/>
-              <a:t>ip</a:t>
-            </a:r>
-            <a:r>
-              <a:rPr lang="zh-CN" altLang="en-US" dirty="0" smtClean="0"/>
-              <a:t>首部长度</a:t>
-            </a:r>
-            <a:r>
-              <a:rPr lang="en-US" altLang="zh-CN" dirty="0" smtClean="0"/>
-              <a:t>20bytes, </a:t>
-            </a:r>
-            <a:r>
-              <a:rPr lang="zh-CN" altLang="en-US" dirty="0" smtClean="0"/>
-              <a:t>首部载荷总长度</a:t>
-            </a:r>
-            <a:r>
-              <a:rPr lang="en-US" altLang="zh-CN" dirty="0" smtClean="0"/>
-              <a:t>60</a:t>
-            </a:r>
-            <a:r>
-              <a:rPr lang="zh-CN" altLang="en-US" dirty="0" smtClean="0"/>
-              <a:t>字节</a:t>
-            </a:r>
-            <a:r>
-              <a:rPr lang="en-US" altLang="zh-CN" dirty="0" smtClean="0"/>
-              <a:t>,</a:t>
+              <a:t>注意这里</a:t>
             </a:r>
             <a:r>
               <a:rPr lang="en-US" altLang="zh-CN" dirty="0" err="1" smtClean="0"/>
               <a:t>ttl</a:t>
             </a:r>
             <a:r>
-              <a:rPr lang="en-US" altLang="zh-CN" dirty="0" smtClean="0"/>
-              <a:t> </a:t>
-            </a:r>
-            <a:r>
               <a:rPr lang="zh-CN" altLang="en-US" dirty="0" smtClean="0"/>
               <a:t>为</a:t>
             </a:r>
             <a:r>
               <a:rPr lang="en-US" altLang="zh-CN" dirty="0" smtClean="0"/>
-              <a:t>55</a:t>
+              <a:t>55, </a:t>
             </a:r>
             <a:r>
               <a:rPr lang="zh-CN" altLang="en-US" dirty="0" smtClean="0"/>
-              <a:t>和命令行一致</a:t>
-            </a:r>
-            <a:r>
-              <a:rPr lang="en-US" altLang="zh-CN" dirty="0" smtClean="0"/>
-              <a:t>,    </a:t>
-            </a:r>
-            <a:r>
-              <a:rPr lang="zh-CN" altLang="en-US" dirty="0" smtClean="0"/>
-              <a:t>请求 </a:t>
-            </a:r>
-            <a:r>
-              <a:rPr lang="en-US" altLang="zh-CN" dirty="0" smtClean="0"/>
-              <a:t>0 </a:t>
-            </a:r>
-            <a:r>
-              <a:rPr lang="zh-CN" altLang="en-US" dirty="0" smtClean="0"/>
-              <a:t>代表应答</a:t>
+              <a:t>后面我们会用到</a:t>
             </a:r>
             <a:r>
               <a:rPr lang="en-US" altLang="zh-CN" dirty="0" smtClean="0"/>
@@ -2029,7 +2426,7 @@
           <a:p>
             <a:fld id="{0B3D93B1-B6F8-47A3-AA63-01CB63EDF94B}" type="slidenum">
               <a:rPr lang="zh-CN" altLang="en-US" smtClean="0"/>
-              <a:t>9</a:t>
+              <a:t>7</a:t>
             </a:fld>
             <a:endParaRPr lang="zh-CN" altLang="en-US"/>
           </a:p>
@@ -2038,7 +2435,7 @@
     </p:spTree>
     <p:extLst>
       <p:ext uri="{BB962C8B-B14F-4D97-AF65-F5344CB8AC3E}">
-        <p14:creationId xmlns:p14="http://schemas.microsoft.com/office/powerpoint/2010/main" val="430717252"/>
+        <p14:creationId xmlns:p14="http://schemas.microsoft.com/office/powerpoint/2010/main" val="2619960748"/>
       </p:ext>
     </p:extLst>
   </p:cSld>
@@ -2093,14 +2490,6 @@
           <a:lstStyle/>
           <a:p>
             <a:r>
-              <a:rPr lang="zh-CN" altLang="en-US" dirty="0" smtClean="0"/>
-              <a:t>三次握手</a:t>
-            </a:r>
-            <a:r>
-              <a:rPr lang="en-US" altLang="zh-CN" dirty="0" smtClean="0"/>
-              <a:t>,</a:t>
-            </a:r>
-            <a:r>
               <a:rPr lang="zh-CN" altLang="en-US" sz="1200" b="0" i="0" kern="1200" dirty="0" smtClean="0">
                 <a:solidFill>
                   <a:schemeClr val="tx1"/>
@@ -2110,7 +2499,7 @@
                 <a:ea typeface="+mn-ea"/>
                 <a:cs typeface="+mn-cs"/>
               </a:rPr>
-              <a:t>客户端发送一个 </a:t>
+              <a:t>在 </a:t>
             </a:r>
             <a:r>
               <a:rPr lang="en-US" altLang="zh-CN" sz="1200" b="0" i="0" kern="1200" dirty="0" smtClean="0">
@@ -2122,7 +2511,7 @@
                 <a:ea typeface="+mn-ea"/>
                 <a:cs typeface="+mn-cs"/>
               </a:rPr>
-              <a:t>TCP</a:t>
+              <a:t>Wireshark </a:t>
             </a:r>
             <a:r>
               <a:rPr lang="zh-CN" altLang="en-US" sz="1200" b="0" i="0" kern="1200" dirty="0" smtClean="0">
@@ -2134,7 +2523,7 @@
                 <a:ea typeface="+mn-ea"/>
                 <a:cs typeface="+mn-cs"/>
               </a:rPr>
-              <a:t>，标志位为 </a:t>
+              <a:t>中，我们可以看到一共抓取了 </a:t>
             </a:r>
             <a:r>
               <a:rPr lang="en-US" altLang="zh-CN" sz="1200" b="0" i="0" kern="1200" dirty="0" smtClean="0">
@@ -2146,7 +2535,7 @@
                 <a:ea typeface="+mn-ea"/>
                 <a:cs typeface="+mn-cs"/>
               </a:rPr>
-              <a:t>SYN</a:t>
+              <a:t>8 </a:t>
             </a:r>
             <a:r>
               <a:rPr lang="zh-CN" altLang="en-US" sz="1200" b="0" i="0" kern="1200" dirty="0" smtClean="0">
@@ -2158,271 +2547,7 @@
                 <a:ea typeface="+mn-ea"/>
                 <a:cs typeface="+mn-cs"/>
               </a:rPr>
-              <a:t>，序列号为 </a:t>
-            </a:r>
-            <a:r>
-              <a:rPr lang="en-US" altLang="zh-CN" sz="1200" b="0" i="0" kern="1200" dirty="0" smtClean="0">
-                <a:solidFill>
-                  <a:schemeClr val="tx1"/>
-                </a:solidFill>
-                <a:effectLst/>
-                <a:latin typeface="+mn-lt"/>
-                <a:ea typeface="+mn-ea"/>
-                <a:cs typeface="+mn-cs"/>
-              </a:rPr>
-              <a:t>0</a:t>
-            </a:r>
-            <a:r>
-              <a:rPr lang="zh-CN" altLang="en-US" sz="1200" b="0" i="0" kern="1200" dirty="0" smtClean="0">
-                <a:solidFill>
-                  <a:schemeClr val="tx1"/>
-                </a:solidFill>
-                <a:effectLst/>
-                <a:latin typeface="+mn-lt"/>
-                <a:ea typeface="+mn-ea"/>
-                <a:cs typeface="+mn-cs"/>
-              </a:rPr>
-              <a:t>，客户端请求建立连接。服务器发回确认包，标志位为 </a:t>
-            </a:r>
-            <a:r>
-              <a:rPr lang="en-US" altLang="zh-CN" sz="1200" b="0" i="0" kern="1200" dirty="0" smtClean="0">
-                <a:solidFill>
-                  <a:schemeClr val="tx1"/>
-                </a:solidFill>
-                <a:effectLst/>
-                <a:latin typeface="+mn-lt"/>
-                <a:ea typeface="+mn-ea"/>
-                <a:cs typeface="+mn-cs"/>
-              </a:rPr>
-              <a:t>SYN</a:t>
-            </a:r>
-            <a:r>
-              <a:rPr lang="zh-CN" altLang="en-US" sz="1200" b="0" i="0" kern="1200" dirty="0" smtClean="0">
-                <a:solidFill>
-                  <a:schemeClr val="tx1"/>
-                </a:solidFill>
-                <a:effectLst/>
-                <a:latin typeface="+mn-lt"/>
-                <a:ea typeface="+mn-ea"/>
-                <a:cs typeface="+mn-cs"/>
-              </a:rPr>
-              <a:t>，</a:t>
-            </a:r>
-            <a:r>
-              <a:rPr lang="en-US" altLang="zh-CN" sz="1200" b="0" i="0" kern="1200" dirty="0" smtClean="0">
-                <a:solidFill>
-                  <a:schemeClr val="tx1"/>
-                </a:solidFill>
-                <a:effectLst/>
-                <a:latin typeface="+mn-lt"/>
-                <a:ea typeface="+mn-ea"/>
-                <a:cs typeface="+mn-cs"/>
-              </a:rPr>
-              <a:t>ACK</a:t>
-            </a:r>
-            <a:r>
-              <a:rPr lang="zh-CN" altLang="en-US" sz="1200" b="0" i="0" kern="1200" dirty="0" smtClean="0">
-                <a:solidFill>
-                  <a:schemeClr val="tx1"/>
-                </a:solidFill>
-                <a:effectLst/>
-                <a:latin typeface="+mn-lt"/>
-                <a:ea typeface="+mn-ea"/>
-                <a:cs typeface="+mn-cs"/>
-              </a:rPr>
-              <a:t>，将确认序号设置为客户的 </a:t>
-            </a:r>
-            <a:r>
-              <a:rPr lang="en-US" altLang="zh-CN" sz="1200" b="0" i="0" kern="1200" dirty="0" smtClean="0">
-                <a:solidFill>
-                  <a:schemeClr val="tx1"/>
-                </a:solidFill>
-                <a:effectLst/>
-                <a:latin typeface="+mn-lt"/>
-                <a:ea typeface="+mn-ea"/>
-                <a:cs typeface="+mn-cs"/>
-              </a:rPr>
-              <a:t>ISN </a:t>
-            </a:r>
-            <a:r>
-              <a:rPr lang="zh-CN" altLang="en-US" sz="1200" b="0" i="0" kern="1200" dirty="0" smtClean="0">
-                <a:solidFill>
-                  <a:schemeClr val="tx1"/>
-                </a:solidFill>
-                <a:effectLst/>
-                <a:latin typeface="+mn-lt"/>
-                <a:ea typeface="+mn-ea"/>
-                <a:cs typeface="+mn-cs"/>
-              </a:rPr>
-              <a:t>加 </a:t>
-            </a:r>
-            <a:r>
-              <a:rPr lang="en-US" altLang="zh-CN" sz="1200" b="0" i="0" kern="1200" dirty="0" smtClean="0">
-                <a:solidFill>
-                  <a:schemeClr val="tx1"/>
-                </a:solidFill>
-                <a:effectLst/>
-                <a:latin typeface="+mn-lt"/>
-                <a:ea typeface="+mn-ea"/>
-                <a:cs typeface="+mn-cs"/>
-              </a:rPr>
-              <a:t>1</a:t>
-            </a:r>
-            <a:r>
-              <a:rPr lang="zh-CN" altLang="en-US" sz="1200" b="0" i="0" kern="1200" dirty="0" smtClean="0">
-                <a:solidFill>
-                  <a:schemeClr val="tx1"/>
-                </a:solidFill>
-                <a:effectLst/>
-                <a:latin typeface="+mn-lt"/>
-                <a:ea typeface="+mn-ea"/>
-                <a:cs typeface="+mn-cs"/>
-              </a:rPr>
-              <a:t>。客户端再次发送确认包，</a:t>
-            </a:r>
-            <a:r>
-              <a:rPr lang="en-US" altLang="zh-CN" sz="1200" b="0" i="0" kern="1200" dirty="0" smtClean="0">
-                <a:solidFill>
-                  <a:schemeClr val="tx1"/>
-                </a:solidFill>
-                <a:effectLst/>
-                <a:latin typeface="+mn-lt"/>
-                <a:ea typeface="+mn-ea"/>
-                <a:cs typeface="+mn-cs"/>
-              </a:rPr>
-              <a:t>SYN </a:t>
-            </a:r>
-            <a:r>
-              <a:rPr lang="zh-CN" altLang="en-US" sz="1200" b="0" i="0" kern="1200" dirty="0" smtClean="0">
-                <a:solidFill>
-                  <a:schemeClr val="tx1"/>
-                </a:solidFill>
-                <a:effectLst/>
-                <a:latin typeface="+mn-lt"/>
-                <a:ea typeface="+mn-ea"/>
-                <a:cs typeface="+mn-cs"/>
-              </a:rPr>
-              <a:t>标志位为 </a:t>
-            </a:r>
-            <a:r>
-              <a:rPr lang="en-US" altLang="zh-CN" sz="1200" b="0" i="0" kern="1200" dirty="0" smtClean="0">
-                <a:solidFill>
-                  <a:schemeClr val="tx1"/>
-                </a:solidFill>
-                <a:effectLst/>
-                <a:latin typeface="+mn-lt"/>
-                <a:ea typeface="+mn-ea"/>
-                <a:cs typeface="+mn-cs"/>
-              </a:rPr>
-              <a:t>0</a:t>
-            </a:r>
-            <a:r>
-              <a:rPr lang="zh-CN" altLang="en-US" sz="1200" b="0" i="0" kern="1200" dirty="0" smtClean="0">
-                <a:solidFill>
-                  <a:schemeClr val="tx1"/>
-                </a:solidFill>
-                <a:effectLst/>
-                <a:latin typeface="+mn-lt"/>
-                <a:ea typeface="+mn-ea"/>
-                <a:cs typeface="+mn-cs"/>
-              </a:rPr>
-              <a:t>，</a:t>
-            </a:r>
-            <a:r>
-              <a:rPr lang="en-US" altLang="zh-CN" sz="1200" b="0" i="0" kern="1200" dirty="0" smtClean="0">
-                <a:solidFill>
-                  <a:schemeClr val="tx1"/>
-                </a:solidFill>
-                <a:effectLst/>
-                <a:latin typeface="+mn-lt"/>
-                <a:ea typeface="+mn-ea"/>
-                <a:cs typeface="+mn-cs"/>
-              </a:rPr>
-              <a:t>ACK </a:t>
-            </a:r>
-            <a:r>
-              <a:rPr lang="zh-CN" altLang="en-US" sz="1200" b="0" i="0" kern="1200" dirty="0" smtClean="0">
-                <a:solidFill>
-                  <a:schemeClr val="tx1"/>
-                </a:solidFill>
-                <a:effectLst/>
-                <a:latin typeface="+mn-lt"/>
-                <a:ea typeface="+mn-ea"/>
-                <a:cs typeface="+mn-cs"/>
-              </a:rPr>
-              <a:t>标志位为 </a:t>
-            </a:r>
-            <a:r>
-              <a:rPr lang="en-US" altLang="zh-CN" sz="1200" b="0" i="0" kern="1200" dirty="0" smtClean="0">
-                <a:solidFill>
-                  <a:schemeClr val="tx1"/>
-                </a:solidFill>
-                <a:effectLst/>
-                <a:latin typeface="+mn-lt"/>
-                <a:ea typeface="+mn-ea"/>
-                <a:cs typeface="+mn-cs"/>
-              </a:rPr>
-              <a:t>1</a:t>
-            </a:r>
-            <a:r>
-              <a:rPr lang="zh-CN" altLang="en-US" sz="1200" b="0" i="0" kern="1200" dirty="0" smtClean="0">
-                <a:solidFill>
-                  <a:schemeClr val="tx1"/>
-                </a:solidFill>
-                <a:effectLst/>
-                <a:latin typeface="+mn-lt"/>
-                <a:ea typeface="+mn-ea"/>
-                <a:cs typeface="+mn-cs"/>
-              </a:rPr>
-              <a:t>，将服务器发来的 </a:t>
-            </a:r>
-            <a:r>
-              <a:rPr lang="en-US" altLang="zh-CN" sz="1200" b="0" i="0" kern="1200" dirty="0" smtClean="0">
-                <a:solidFill>
-                  <a:schemeClr val="tx1"/>
-                </a:solidFill>
-                <a:effectLst/>
-                <a:latin typeface="+mn-lt"/>
-                <a:ea typeface="+mn-ea"/>
-                <a:cs typeface="+mn-cs"/>
-              </a:rPr>
-              <a:t>ACK </a:t>
-            </a:r>
-            <a:r>
-              <a:rPr lang="zh-CN" altLang="en-US" sz="1200" b="0" i="0" kern="1200" dirty="0" smtClean="0">
-                <a:solidFill>
-                  <a:schemeClr val="tx1"/>
-                </a:solidFill>
-                <a:effectLst/>
-                <a:latin typeface="+mn-lt"/>
-                <a:ea typeface="+mn-ea"/>
-                <a:cs typeface="+mn-cs"/>
-              </a:rPr>
-              <a:t>序号字段加 </a:t>
-            </a:r>
-            <a:r>
-              <a:rPr lang="en-US" altLang="zh-CN" sz="1200" b="0" i="0" kern="1200" dirty="0" smtClean="0">
-                <a:solidFill>
-                  <a:schemeClr val="tx1"/>
-                </a:solidFill>
-                <a:effectLst/>
-                <a:latin typeface="+mn-lt"/>
-                <a:ea typeface="+mn-ea"/>
-                <a:cs typeface="+mn-cs"/>
-              </a:rPr>
-              <a:t>1</a:t>
-            </a:r>
-            <a:r>
-              <a:rPr lang="zh-CN" altLang="en-US" sz="1200" b="0" i="0" kern="1200" dirty="0" smtClean="0">
-                <a:solidFill>
-                  <a:schemeClr val="tx1"/>
-                </a:solidFill>
-                <a:effectLst/>
-                <a:latin typeface="+mn-lt"/>
-                <a:ea typeface="+mn-ea"/>
-                <a:cs typeface="+mn-cs"/>
-              </a:rPr>
-              <a:t>，放在确定字段中发送给对方。</a:t>
+              <a:t>个数据包，与命令行显示的数量一致，分别为双方的请求与应答。</a:t>
             </a:r>
             <a:endParaRPr lang="zh-CN" altLang="en-US" dirty="0"/>
           </a:p>
@@ -2445,7 +2570,7 @@
           <a:p>
             <a:fld id="{0B3D93B1-B6F8-47A3-AA63-01CB63EDF94B}" type="slidenum">
               <a:rPr lang="zh-CN" altLang="en-US" smtClean="0"/>
-              <a:t>10</a:t>
+              <a:t>8</a:t>
             </a:fld>
             <a:endParaRPr lang="zh-CN" altLang="en-US"/>
           </a:p>
@@ -2454,7 +2579,7 @@
     </p:spTree>
     <p:extLst>
       <p:ext uri="{BB962C8B-B14F-4D97-AF65-F5344CB8AC3E}">
-        <p14:creationId xmlns:p14="http://schemas.microsoft.com/office/powerpoint/2010/main" val="961088732"/>
+        <p14:creationId xmlns:p14="http://schemas.microsoft.com/office/powerpoint/2010/main" val="3463599954"/>
       </p:ext>
     </p:extLst>
   </p:cSld>
@@ -2510,16 +2635,92 @@
           <a:p>
             <a:r>
               <a:rPr lang="zh-CN" altLang="en-US" dirty="0" smtClean="0"/>
-              <a:t>四次挥手</a:t>
+              <a:t>看到</a:t>
+            </a:r>
+            <a:r>
+              <a:rPr lang="en-US" altLang="zh-CN" dirty="0" err="1" smtClean="0"/>
+              <a:t>ip</a:t>
+            </a:r>
+            <a:r>
+              <a:rPr lang="en-US" altLang="zh-CN" dirty="0" smtClean="0"/>
+              <a:t> </a:t>
+            </a:r>
+            <a:r>
+              <a:rPr lang="zh-CN" altLang="en-US" dirty="0" smtClean="0"/>
+              <a:t>版本号</a:t>
+            </a:r>
+            <a:r>
+              <a:rPr lang="en-US" altLang="zh-CN" dirty="0" smtClean="0"/>
+              <a:t>, </a:t>
+            </a:r>
+            <a:r>
+              <a:rPr lang="en-US" altLang="zh-CN" dirty="0" err="1" smtClean="0"/>
+              <a:t>ip</a:t>
+            </a:r>
+            <a:r>
+              <a:rPr lang="zh-CN" altLang="en-US" dirty="0" smtClean="0"/>
+              <a:t>首部长度</a:t>
+            </a:r>
+            <a:r>
+              <a:rPr lang="en-US" altLang="zh-CN" dirty="0" smtClean="0"/>
+              <a:t>20bytes, </a:t>
+            </a:r>
+            <a:r>
+              <a:rPr lang="zh-CN" altLang="en-US" dirty="0" smtClean="0"/>
+              <a:t>首部载荷总长度</a:t>
+            </a:r>
+            <a:r>
+              <a:rPr lang="en-US" altLang="zh-CN" dirty="0" smtClean="0"/>
+              <a:t>60</a:t>
+            </a:r>
+            <a:r>
+              <a:rPr lang="zh-CN" altLang="en-US" dirty="0" smtClean="0"/>
+              <a:t>字节</a:t>
             </a:r>
             <a:r>
               <a:rPr lang="en-US" altLang="zh-CN" dirty="0" smtClean="0"/>
               <a:t>,</a:t>
             </a:r>
             <a:r>
-              <a:rPr lang="en-US" altLang="zh-CN" baseline="0" dirty="0" smtClean="0"/>
+              <a:rPr lang="en-US" altLang="zh-CN" dirty="0" err="1" smtClean="0"/>
+              <a:t>ttl</a:t>
+            </a:r>
+            <a:r>
+              <a:rPr lang="en-US" altLang="zh-CN" dirty="0" smtClean="0"/>
               <a:t> </a:t>
             </a:r>
+            <a:r>
+              <a:rPr lang="zh-CN" altLang="en-US" dirty="0" smtClean="0"/>
+              <a:t>为</a:t>
+            </a:r>
+            <a:r>
+              <a:rPr lang="en-US" altLang="zh-CN" dirty="0" smtClean="0"/>
+              <a:t>55</a:t>
+            </a:r>
+            <a:r>
+              <a:rPr lang="zh-CN" altLang="en-US" dirty="0" smtClean="0"/>
+              <a:t>和命令行一致</a:t>
+            </a:r>
+            <a:r>
+              <a:rPr lang="en-US" altLang="zh-CN" dirty="0" smtClean="0"/>
+              <a:t>,    </a:t>
+            </a:r>
+            <a:r>
+              <a:rPr lang="zh-CN" altLang="en-US" dirty="0" smtClean="0"/>
+              <a:t>请求 </a:t>
+            </a:r>
+            <a:r>
+              <a:rPr lang="en-US" altLang="zh-CN" dirty="0" smtClean="0"/>
+              <a:t>0 </a:t>
+            </a:r>
+            <a:r>
+              <a:rPr lang="zh-CN" altLang="en-US" dirty="0" smtClean="0"/>
+              <a:t>代表应答</a:t>
+            </a:r>
+            <a:r>
+              <a:rPr lang="en-US" altLang="zh-CN" dirty="0" smtClean="0"/>
+              <a:t>. </a:t>
+            </a:r>
             <a:endParaRPr lang="zh-CN" altLang="en-US" dirty="0"/>
           </a:p>
         </p:txBody>
@@ -2541,7 +2742,7 @@
           <a:p>
             <a:fld id="{0B3D93B1-B6F8-47A3-AA63-01CB63EDF94B}" type="slidenum">
               <a:rPr lang="zh-CN" altLang="en-US" smtClean="0"/>
-              <a:t>11</a:t>
+              <a:t>9</a:t>
             </a:fld>
             <a:endParaRPr lang="zh-CN" altLang="en-US"/>
           </a:p>
@@ -2550,7 +2751,7 @@
     </p:spTree>
     <p:extLst>
       <p:ext uri="{BB962C8B-B14F-4D97-AF65-F5344CB8AC3E}">
-        <p14:creationId xmlns:p14="http://schemas.microsoft.com/office/powerpoint/2010/main" val="1581839253"/>
+        <p14:creationId xmlns:p14="http://schemas.microsoft.com/office/powerpoint/2010/main" val="430717252"/>
       </p:ext>
     </p:extLst>
   </p:cSld>
@@ -2606,31 +2807,335 @@
           <a:p>
             <a:r>
               <a:rPr lang="zh-CN" altLang="en-US" dirty="0" smtClean="0"/>
-              <a:t>我们看到</a:t>
-            </a:r>
-            <a:r>
-              <a:rPr lang="zh-CN" altLang="en-US" dirty="0" smtClean="0"/>
-              <a:t>可以抓到</a:t>
-            </a:r>
-            <a:r>
-              <a:rPr lang="en-US" altLang="zh-CN" dirty="0" err="1" smtClean="0"/>
-              <a:t>qq</a:t>
-            </a:r>
-            <a:r>
-              <a:rPr lang="zh-CN" altLang="en-US" dirty="0" smtClean="0"/>
-              <a:t>的数据包</a:t>
+              <a:t>三次握手</a:t>
             </a:r>
             <a:r>
               <a:rPr lang="en-US" altLang="zh-CN" dirty="0" smtClean="0"/>
-              <a:t>. </a:t>
-            </a:r>
-            <a:r>
-              <a:rPr lang="zh-CN" altLang="en-US" dirty="0" smtClean="0"/>
-              <a:t>应用层协议为</a:t>
-            </a:r>
-            <a:r>
-              <a:rPr lang="en-US" altLang="zh-CN" dirty="0" smtClean="0"/>
-              <a:t>OICQ</a:t>
+              <a:t>,</a:t>
+            </a:r>
+            <a:r>
+              <a:rPr lang="zh-CN" altLang="en-US" sz="1200" b="0" i="0" kern="1200" dirty="0" smtClean="0">
+                <a:solidFill>
+                  <a:schemeClr val="tx1"/>
+                </a:solidFill>
+                <a:effectLst/>
+                <a:latin typeface="+mn-lt"/>
+                <a:ea typeface="+mn-ea"/>
+                <a:cs typeface="+mn-cs"/>
+              </a:rPr>
+              <a:t>客户端发送一个 </a:t>
+            </a:r>
+            <a:r>
+              <a:rPr lang="en-US" altLang="zh-CN" sz="1200" b="0" i="0" kern="1200" dirty="0" smtClean="0">
+                <a:solidFill>
+                  <a:schemeClr val="tx1"/>
+                </a:solidFill>
+                <a:effectLst/>
+                <a:latin typeface="+mn-lt"/>
+                <a:ea typeface="+mn-ea"/>
+                <a:cs typeface="+mn-cs"/>
+              </a:rPr>
+              <a:t>TCP</a:t>
+            </a:r>
+            <a:r>
+              <a:rPr lang="zh-CN" altLang="en-US" sz="1200" b="0" i="0" kern="1200" dirty="0" smtClean="0">
+                <a:solidFill>
+                  <a:schemeClr val="tx1"/>
+                </a:solidFill>
+                <a:effectLst/>
+                <a:latin typeface="+mn-lt"/>
+                <a:ea typeface="+mn-ea"/>
+                <a:cs typeface="+mn-cs"/>
+              </a:rPr>
+              <a:t>，标志位为 </a:t>
+            </a:r>
+            <a:r>
+              <a:rPr lang="en-US" altLang="zh-CN" sz="1200" b="0" i="0" kern="1200" dirty="0" smtClean="0">
+                <a:solidFill>
+                  <a:schemeClr val="tx1"/>
+                </a:solidFill>
+                <a:effectLst/>
+                <a:latin typeface="+mn-lt"/>
+                <a:ea typeface="+mn-ea"/>
+                <a:cs typeface="+mn-cs"/>
+              </a:rPr>
+              <a:t>SYN</a:t>
+            </a:r>
+            <a:r>
+              <a:rPr lang="zh-CN" altLang="en-US" sz="1200" b="0" i="0" kern="1200" dirty="0" smtClean="0">
+                <a:solidFill>
+                  <a:schemeClr val="tx1"/>
+                </a:solidFill>
+                <a:effectLst/>
+                <a:latin typeface="+mn-lt"/>
+                <a:ea typeface="+mn-ea"/>
+                <a:cs typeface="+mn-cs"/>
+              </a:rPr>
+              <a:t>，序列号为 </a:t>
+            </a:r>
+            <a:r>
+              <a:rPr lang="en-US" altLang="zh-CN" sz="1200" b="0" i="0" kern="1200" dirty="0" smtClean="0">
+                <a:solidFill>
+                  <a:schemeClr val="tx1"/>
+                </a:solidFill>
+                <a:effectLst/>
+                <a:latin typeface="+mn-lt"/>
+                <a:ea typeface="+mn-ea"/>
+                <a:cs typeface="+mn-cs"/>
+              </a:rPr>
+              <a:t>0</a:t>
+            </a:r>
+            <a:r>
+              <a:rPr lang="zh-CN" altLang="en-US" sz="1200" b="0" i="0" kern="1200" dirty="0" smtClean="0">
+                <a:solidFill>
+                  <a:schemeClr val="tx1"/>
+                </a:solidFill>
+                <a:effectLst/>
+                <a:latin typeface="+mn-lt"/>
+                <a:ea typeface="+mn-ea"/>
+                <a:cs typeface="+mn-cs"/>
+              </a:rPr>
+              <a:t>，客户端请求建立连接。服务器发回确认包，标志位为 </a:t>
+            </a:r>
+            <a:r>
+              <a:rPr lang="en-US" altLang="zh-CN" sz="1200" b="0" i="0" kern="1200" dirty="0" smtClean="0">
+                <a:solidFill>
+                  <a:schemeClr val="tx1"/>
+                </a:solidFill>
+                <a:effectLst/>
+                <a:latin typeface="+mn-lt"/>
+                <a:ea typeface="+mn-ea"/>
+                <a:cs typeface="+mn-cs"/>
+              </a:rPr>
+              <a:t>SYN</a:t>
+            </a:r>
+            <a:r>
+              <a:rPr lang="zh-CN" altLang="en-US" sz="1200" b="0" i="0" kern="1200" dirty="0" smtClean="0">
+                <a:solidFill>
+                  <a:schemeClr val="tx1"/>
+                </a:solidFill>
+                <a:effectLst/>
+                <a:latin typeface="+mn-lt"/>
+                <a:ea typeface="+mn-ea"/>
+                <a:cs typeface="+mn-cs"/>
+              </a:rPr>
+              <a:t>，</a:t>
+            </a:r>
+            <a:r>
+              <a:rPr lang="en-US" altLang="zh-CN" sz="1200" b="0" i="0" kern="1200" dirty="0" smtClean="0">
+                <a:solidFill>
+                  <a:schemeClr val="tx1"/>
+                </a:solidFill>
+                <a:effectLst/>
+                <a:latin typeface="+mn-lt"/>
+                <a:ea typeface="+mn-ea"/>
+                <a:cs typeface="+mn-cs"/>
+              </a:rPr>
+              <a:t>ACK</a:t>
+            </a:r>
+            <a:r>
+              <a:rPr lang="zh-CN" altLang="en-US" sz="1200" b="0" i="0" kern="1200" dirty="0" smtClean="0">
+                <a:solidFill>
+                  <a:schemeClr val="tx1"/>
+                </a:solidFill>
+                <a:effectLst/>
+                <a:latin typeface="+mn-lt"/>
+                <a:ea typeface="+mn-ea"/>
+                <a:cs typeface="+mn-cs"/>
+              </a:rPr>
+              <a:t>，将确认序号设置为客户的 </a:t>
+            </a:r>
+            <a:r>
+              <a:rPr lang="en-US" altLang="zh-CN" sz="1200" b="0" i="0" kern="1200" dirty="0" smtClean="0">
+                <a:solidFill>
+                  <a:schemeClr val="tx1"/>
+                </a:solidFill>
+                <a:effectLst/>
+                <a:latin typeface="+mn-lt"/>
+                <a:ea typeface="+mn-ea"/>
+                <a:cs typeface="+mn-cs"/>
+              </a:rPr>
+              <a:t>ISN </a:t>
+            </a:r>
+            <a:r>
+              <a:rPr lang="zh-CN" altLang="en-US" sz="1200" b="0" i="0" kern="1200" dirty="0" smtClean="0">
+                <a:solidFill>
+                  <a:schemeClr val="tx1"/>
+                </a:solidFill>
+                <a:effectLst/>
+                <a:latin typeface="+mn-lt"/>
+                <a:ea typeface="+mn-ea"/>
+                <a:cs typeface="+mn-cs"/>
+              </a:rPr>
+              <a:t>加 </a:t>
+            </a:r>
+            <a:r>
+              <a:rPr lang="en-US" altLang="zh-CN" sz="1200" b="0" i="0" kern="1200" dirty="0" smtClean="0">
+                <a:solidFill>
+                  <a:schemeClr val="tx1"/>
+                </a:solidFill>
+                <a:effectLst/>
+                <a:latin typeface="+mn-lt"/>
+                <a:ea typeface="+mn-ea"/>
+                <a:cs typeface="+mn-cs"/>
+              </a:rPr>
+              <a:t>1</a:t>
+            </a:r>
+            <a:r>
+              <a:rPr lang="zh-CN" altLang="en-US" sz="1200" b="0" i="0" kern="1200" dirty="0" smtClean="0">
+                <a:solidFill>
+                  <a:schemeClr val="tx1"/>
+                </a:solidFill>
+                <a:effectLst/>
+                <a:latin typeface="+mn-lt"/>
+                <a:ea typeface="+mn-ea"/>
+                <a:cs typeface="+mn-cs"/>
+              </a:rPr>
+              <a:t>。客户端再次发送确认包，</a:t>
+            </a:r>
+            <a:r>
+              <a:rPr lang="en-US" altLang="zh-CN" sz="1200" b="0" i="0" kern="1200" dirty="0" smtClean="0">
+                <a:solidFill>
+                  <a:schemeClr val="tx1"/>
+                </a:solidFill>
+                <a:effectLst/>
+                <a:latin typeface="+mn-lt"/>
+                <a:ea typeface="+mn-ea"/>
+                <a:cs typeface="+mn-cs"/>
+              </a:rPr>
+              <a:t>SYN </a:t>
+            </a:r>
+            <a:r>
+              <a:rPr lang="zh-CN" altLang="en-US" sz="1200" b="0" i="0" kern="1200" dirty="0" smtClean="0">
+                <a:solidFill>
+                  <a:schemeClr val="tx1"/>
+                </a:solidFill>
+                <a:effectLst/>
+                <a:latin typeface="+mn-lt"/>
+                <a:ea typeface="+mn-ea"/>
+                <a:cs typeface="+mn-cs"/>
+              </a:rPr>
+              <a:t>标志位为 </a:t>
+            </a:r>
+            <a:r>
+              <a:rPr lang="en-US" altLang="zh-CN" sz="1200" b="0" i="0" kern="1200" dirty="0" smtClean="0">
+                <a:solidFill>
+                  <a:schemeClr val="tx1"/>
+                </a:solidFill>
+                <a:effectLst/>
+                <a:latin typeface="+mn-lt"/>
+                <a:ea typeface="+mn-ea"/>
+                <a:cs typeface="+mn-cs"/>
+              </a:rPr>
+              <a:t>0</a:t>
+            </a:r>
+            <a:r>
+              <a:rPr lang="zh-CN" altLang="en-US" sz="1200" b="0" i="0" kern="1200" dirty="0" smtClean="0">
+                <a:solidFill>
+                  <a:schemeClr val="tx1"/>
+                </a:solidFill>
+                <a:effectLst/>
+                <a:latin typeface="+mn-lt"/>
+                <a:ea typeface="+mn-ea"/>
+                <a:cs typeface="+mn-cs"/>
+              </a:rPr>
+              <a:t>，</a:t>
+            </a:r>
+            <a:r>
+              <a:rPr lang="en-US" altLang="zh-CN" sz="1200" b="0" i="0" kern="1200" dirty="0" smtClean="0">
+                <a:solidFill>
+                  <a:schemeClr val="tx1"/>
+                </a:solidFill>
+                <a:effectLst/>
+                <a:latin typeface="+mn-lt"/>
+                <a:ea typeface="+mn-ea"/>
+                <a:cs typeface="+mn-cs"/>
+              </a:rPr>
+              <a:t>ACK </a:t>
+            </a:r>
+            <a:r>
+              <a:rPr lang="zh-CN" altLang="en-US" sz="1200" b="0" i="0" kern="1200" dirty="0" smtClean="0">
+                <a:solidFill>
+                  <a:schemeClr val="tx1"/>
+                </a:solidFill>
+                <a:effectLst/>
+                <a:latin typeface="+mn-lt"/>
+                <a:ea typeface="+mn-ea"/>
+                <a:cs typeface="+mn-cs"/>
+              </a:rPr>
+              <a:t>标志位为 </a:t>
+            </a:r>
+            <a:r>
+              <a:rPr lang="en-US" altLang="zh-CN" sz="1200" b="0" i="0" kern="1200" dirty="0" smtClean="0">
+                <a:solidFill>
+                  <a:schemeClr val="tx1"/>
+                </a:solidFill>
+                <a:effectLst/>
+                <a:latin typeface="+mn-lt"/>
+                <a:ea typeface="+mn-ea"/>
+                <a:cs typeface="+mn-cs"/>
+              </a:rPr>
+              <a:t>1</a:t>
+            </a:r>
+            <a:r>
+              <a:rPr lang="zh-CN" altLang="en-US" sz="1200" b="0" i="0" kern="1200" dirty="0" smtClean="0">
+                <a:solidFill>
+                  <a:schemeClr val="tx1"/>
+                </a:solidFill>
+                <a:effectLst/>
+                <a:latin typeface="+mn-lt"/>
+                <a:ea typeface="+mn-ea"/>
+                <a:cs typeface="+mn-cs"/>
+              </a:rPr>
+              <a:t>，将服务器发来的 </a:t>
+            </a:r>
+            <a:r>
+              <a:rPr lang="en-US" altLang="zh-CN" sz="1200" b="0" i="0" kern="1200" dirty="0" smtClean="0">
+                <a:solidFill>
+                  <a:schemeClr val="tx1"/>
+                </a:solidFill>
+                <a:effectLst/>
+                <a:latin typeface="+mn-lt"/>
+                <a:ea typeface="+mn-ea"/>
+                <a:cs typeface="+mn-cs"/>
+              </a:rPr>
+              <a:t>ACK </a:t>
+            </a:r>
+            <a:r>
+              <a:rPr lang="zh-CN" altLang="en-US" sz="1200" b="0" i="0" kern="1200" dirty="0" smtClean="0">
+                <a:solidFill>
+                  <a:schemeClr val="tx1"/>
+                </a:solidFill>
+                <a:effectLst/>
+                <a:latin typeface="+mn-lt"/>
+                <a:ea typeface="+mn-ea"/>
+                <a:cs typeface="+mn-cs"/>
+              </a:rPr>
+              <a:t>序号字段加 </a:t>
+            </a:r>
+            <a:r>
+              <a:rPr lang="en-US" altLang="zh-CN" sz="1200" b="0" i="0" kern="1200" dirty="0" smtClean="0">
+                <a:solidFill>
+                  <a:schemeClr val="tx1"/>
+                </a:solidFill>
+                <a:effectLst/>
+                <a:latin typeface="+mn-lt"/>
+                <a:ea typeface="+mn-ea"/>
+                <a:cs typeface="+mn-cs"/>
+              </a:rPr>
+              <a:t>1</a:t>
+            </a:r>
+            <a:r>
+              <a:rPr lang="zh-CN" altLang="en-US" sz="1200" b="0" i="0" kern="1200" dirty="0" smtClean="0">
+                <a:solidFill>
+                  <a:schemeClr val="tx1"/>
+                </a:solidFill>
+                <a:effectLst/>
+                <a:latin typeface="+mn-lt"/>
+                <a:ea typeface="+mn-ea"/>
+                <a:cs typeface="+mn-cs"/>
+              </a:rPr>
+              <a:t>，放在确定字段中发送给对方。</a:t>
             </a:r>
             <a:endParaRPr lang="zh-CN" altLang="en-US" dirty="0"/>
           </a:p>
@@ -2653,7 +3158,7 @@
           <a:p>
             <a:fld id="{0B3D93B1-B6F8-47A3-AA63-01CB63EDF94B}" type="slidenum">
               <a:rPr lang="zh-CN" altLang="en-US" smtClean="0"/>
-              <a:t>12</a:t>
+              <a:t>10</a:t>
             </a:fld>
             <a:endParaRPr lang="zh-CN" altLang="en-US"/>
           </a:p>
@@ -2662,7 +3167,7 @@
     </p:spTree>
     <p:extLst>
       <p:ext uri="{BB962C8B-B14F-4D97-AF65-F5344CB8AC3E}">
-        <p14:creationId xmlns:p14="http://schemas.microsoft.com/office/powerpoint/2010/main" val="569516348"/>
+        <p14:creationId xmlns:p14="http://schemas.microsoft.com/office/powerpoint/2010/main" val="961088732"/>
       </p:ext>
     </p:extLst>
   </p:cSld>
@@ -2803,7 +3308,7 @@
           <a:p>
             <a:fld id="{C2C963BD-A7FA-4B80-883C-3B411203815F}" type="datetimeFigureOut">
               <a:rPr lang="zh-CN" altLang="en-US" smtClean="0"/>
-              <a:t>2021/4/15</a:t>
+              <a:t>2021/4/21</a:t>
             </a:fld>
             <a:endParaRPr lang="zh-CN" altLang="en-US"/>
           </a:p>
@@ -2973,7 +3478,7 @@
           <a:p>
             <a:fld id="{C2C963BD-A7FA-4B80-883C-3B411203815F}" type="datetimeFigureOut">
               <a:rPr lang="zh-CN" altLang="en-US" smtClean="0"/>
-              <a:t>2021/4/15</a:t>
+              <a:t>2021/4/21</a:t>
             </a:fld>
             <a:endParaRPr lang="zh-CN" altLang="en-US"/>
           </a:p>
@@ -3153,7 +3658,7 @@
           <a:p>
             <a:fld id="{C2C963BD-A7FA-4B80-883C-3B411203815F}" type="datetimeFigureOut">
               <a:rPr lang="zh-CN" altLang="en-US" smtClean="0"/>
-              <a:t>2021/4/15</a:t>
+              <a:t>2021/4/21</a:t>
             </a:fld>
             <a:endParaRPr lang="zh-CN" altLang="en-US"/>
           </a:p>
@@ -3323,7 +3828,7 @@
           <a:p>
             <a:fld id="{C2C963BD-A7FA-4B80-883C-3B411203815F}" type="datetimeFigureOut">
               <a:rPr lang="zh-CN" altLang="en-US" smtClean="0"/>
-              <a:t>2021/4/15</a:t>
+              <a:t>2021/4/21</a:t>
             </a:fld>
             <a:endParaRPr lang="zh-CN" altLang="en-US"/>
           </a:p>
@@ -3569,7 +4074,7 @@
           <a:p>
             <a:fld id="{C2C963BD-A7FA-4B80-883C-3B411203815F}" type="datetimeFigureOut">
               <a:rPr lang="zh-CN" altLang="en-US" smtClean="0"/>
-              <a:t>2021/4/15</a:t>
+              <a:t>2021/4/21</a:t>
             </a:fld>
             <a:endParaRPr lang="zh-CN" altLang="en-US"/>
           </a:p>
@@ -3801,7 +4306,7 @@
           <a:p>
             <a:fld id="{C2C963BD-A7FA-4B80-883C-3B411203815F}" type="datetimeFigureOut">
               <a:rPr lang="zh-CN" altLang="en-US" smtClean="0"/>
-              <a:t>2021/4/15</a:t>
+              <a:t>2021/4/21</a:t>
             </a:fld>
             <a:endParaRPr lang="zh-CN" altLang="en-US"/>
           </a:p>
@@ -4168,7 +4673,7 @@
           <a:p>
             <a:fld id="{C2C963BD-A7FA-4B80-883C-3B411203815F}" type="datetimeFigureOut">
               <a:rPr lang="zh-CN" altLang="en-US" smtClean="0"/>
-              <a:t>2021/4/15</a:t>
+              <a:t>2021/4/21</a:t>
             </a:fld>
             <a:endParaRPr lang="zh-CN" altLang="en-US"/>
           </a:p>
@@ -4286,7 +4791,7 @@
           <a:p>
             <a:fld id="{C2C963BD-A7FA-4B80-883C-3B411203815F}" type="datetimeFigureOut">
               <a:rPr lang="zh-CN" altLang="en-US" smtClean="0"/>
-              <a:t>2021/4/15</a:t>
+              <a:t>2021/4/21</a:t>
             </a:fld>
             <a:endParaRPr lang="zh-CN" altLang="en-US"/>
           </a:p>
@@ -4381,7 +4886,7 @@
           <a:p>
             <a:fld id="{C2C963BD-A7FA-4B80-883C-3B411203815F}" type="datetimeFigureOut">
               <a:rPr lang="zh-CN" altLang="en-US" smtClean="0"/>
-              <a:t>2021/4/15</a:t>
+              <a:t>2021/4/21</a:t>
             </a:fld>
             <a:endParaRPr lang="zh-CN" altLang="en-US"/>
           </a:p>
@@ -4658,7 +5163,7 @@
           <a:p>
             <a:fld id="{C2C963BD-A7FA-4B80-883C-3B411203815F}" type="datetimeFigureOut">
               <a:rPr lang="zh-CN" altLang="en-US" smtClean="0"/>
-              <a:t>2021/4/15</a:t>
+              <a:t>2021/4/21</a:t>
             </a:fld>
             <a:endParaRPr lang="zh-CN" altLang="en-US"/>
           </a:p>
@@ -4911,7 +5416,7 @@
           <a:p>
             <a:fld id="{C2C963BD-A7FA-4B80-883C-3B411203815F}" type="datetimeFigureOut">
               <a:rPr lang="zh-CN" altLang="en-US" smtClean="0"/>
-              <a:t>2021/4/15</a:t>
+              <a:t>2021/4/21</a:t>
             </a:fld>
             <a:endParaRPr lang="zh-CN" altLang="en-US"/>
           </a:p>
@@ -5124,7 +5629,7 @@
           <a:p>
             <a:fld id="{C2C963BD-A7FA-4B80-883C-3B411203815F}" type="datetimeFigureOut">
               <a:rPr lang="zh-CN" altLang="en-US" smtClean="0"/>
-              <a:t>2021/4/15</a:t>
+              <a:t>2021/4/21</a:t>
             </a:fld>
             <a:endParaRPr lang="zh-CN" altLang="en-US"/>
           </a:p>
@@ -5700,6 +6205,13 @@
   <p:clrMapOvr>
     <a:masterClrMapping/>
   </p:clrMapOvr>
+  <p:timing>
+    <p:tnLst>
+      <p:par>
+        <p:cTn id="1" dur="indefinite" restart="never" nodeType="tmRoot"/>
+      </p:par>
+    </p:tnLst>
+  </p:timing>
 </p:sld>
 </file>
 
@@ -5804,6 +6316,13 @@
   <p:clrMapOvr>
     <a:masterClrMapping/>
   </p:clrMapOvr>
+  <p:timing>
+    <p:tnLst>
+      <p:par>
+        <p:cTn id="1" dur="indefinite" restart="never" nodeType="tmRoot"/>
+      </p:par>
+    </p:tnLst>
+  </p:timing>
 </p:sld>
 </file>
 
@@ -5894,8 +6413,8 @@
         </p:blipFill>
         <p:spPr>
           <a:xfrm>
-            <a:off x="838199" y="2454225"/>
-            <a:ext cx="10250273" cy="2745928"/>
+            <a:off x="838199" y="2454224"/>
+            <a:ext cx="13249594" cy="3549411"/>
           </a:xfrm>
           <a:prstGeom prst="rect">
             <a:avLst/>
@@ -5915,9 +6434,229 @@
   <p:timing>
     <p:tnLst>
       <p:par>
-        <p:cTn id="1" dur="indefinite" restart="never" nodeType="tmRoot"/>
+        <p:cTn id="1" dur="indefinite" restart="never" nodeType="tmRoot">
+          <p:childTnLst>
+            <p:seq concurrent="1" nextAc="seek">
+              <p:cTn id="2" dur="indefinite" nodeType="mainSeq">
+                <p:childTnLst>
+                  <p:par>
+                    <p:cTn id="3" fill="hold">
+                      <p:stCondLst>
+                        <p:cond delay="indefinite"/>
+                      </p:stCondLst>
+                      <p:childTnLst>
+                        <p:par>
+                          <p:cTn id="4" fill="hold">
+                            <p:stCondLst>
+                              <p:cond delay="0"/>
+                            </p:stCondLst>
+                            <p:childTnLst>
+                              <p:par>
+                                <p:cTn id="5" presetID="2" presetClass="entr" presetSubtype="4" fill="hold" grpId="0" nodeType="clickEffect">
+                                  <p:stCondLst>
+                                    <p:cond delay="0"/>
+                                  </p:stCondLst>
+                                  <p:childTnLst>
+                                    <p:set>
+                                      <p:cBhvr>
+                                        <p:cTn id="6" dur="1" fill="hold">
+                                          <p:stCondLst>
+                                            <p:cond delay="0"/>
+                                          </p:stCondLst>
+                                        </p:cTn>
+                                        <p:tgtEl>
+                                          <p:spTgt spid="3">
+                                            <p:txEl>
+                                              <p:pRg st="0" end="0"/>
+                                            </p:txEl>
+                                          </p:spTgt>
+                                        </p:tgtEl>
+                                        <p:attrNameLst>
+                                          <p:attrName>style.visibility</p:attrName>
+                                        </p:attrNameLst>
+                                      </p:cBhvr>
+                                      <p:to>
+                                        <p:strVal val="visible"/>
+                                      </p:to>
+                                    </p:set>
+                                    <p:anim calcmode="lin" valueType="num">
+                                      <p:cBhvr additive="base">
+                                        <p:cTn id="7" dur="500" fill="hold"/>
+                                        <p:tgtEl>
+                                          <p:spTgt spid="3">
+                                            <p:txEl>
+                                              <p:pRg st="0" end="0"/>
+                                            </p:txEl>
+                                          </p:spTgt>
+                                        </p:tgtEl>
+                                        <p:attrNameLst>
+                                          <p:attrName>ppt_x</p:attrName>
+                                        </p:attrNameLst>
+                                      </p:cBhvr>
+                                      <p:tavLst>
+                                        <p:tav tm="0">
+                                          <p:val>
+                                            <p:strVal val="#ppt_x"/>
+                                          </p:val>
+                                        </p:tav>
+                                        <p:tav tm="100000">
+                                          <p:val>
+                                            <p:strVal val="#ppt_x"/>
+                                          </p:val>
+                                        </p:tav>
+                                      </p:tavLst>
+                                    </p:anim>
+                                    <p:anim calcmode="lin" valueType="num">
+                                      <p:cBhvr additive="base">
+                                        <p:cTn id="8" dur="500" fill="hold"/>
+                                        <p:tgtEl>
+                                          <p:spTgt spid="3">
+                                            <p:txEl>
+                                              <p:pRg st="0" end="0"/>
+                                            </p:txEl>
+                                          </p:spTgt>
+                                        </p:tgtEl>
+                                        <p:attrNameLst>
+                                          <p:attrName>ppt_y</p:attrName>
+                                        </p:attrNameLst>
+                                      </p:cBhvr>
+                                      <p:tavLst>
+                                        <p:tav tm="0">
+                                          <p:val>
+                                            <p:strVal val="1+#ppt_h/2"/>
+                                          </p:val>
+                                        </p:tav>
+                                        <p:tav tm="100000">
+                                          <p:val>
+                                            <p:strVal val="#ppt_y"/>
+                                          </p:val>
+                                        </p:tav>
+                                      </p:tavLst>
+                                    </p:anim>
+                                  </p:childTnLst>
+                                </p:cTn>
+                              </p:par>
+                            </p:childTnLst>
+                          </p:cTn>
+                        </p:par>
+                      </p:childTnLst>
+                    </p:cTn>
+                  </p:par>
+                  <p:par>
+                    <p:cTn id="9" fill="hold">
+                      <p:stCondLst>
+                        <p:cond delay="indefinite"/>
+                      </p:stCondLst>
+                      <p:childTnLst>
+                        <p:par>
+                          <p:cTn id="10" fill="hold">
+                            <p:stCondLst>
+                              <p:cond delay="0"/>
+                            </p:stCondLst>
+                            <p:childTnLst>
+                              <p:par>
+                                <p:cTn id="11" presetID="2" presetClass="entr" presetSubtype="4" fill="hold" nodeType="clickEffect">
+                                  <p:stCondLst>
+                                    <p:cond delay="0"/>
+                                  </p:stCondLst>
+                                  <p:childTnLst>
+                                    <p:set>
+                                      <p:cBhvr>
+                                        <p:cTn id="12" dur="1" fill="hold">
+                                          <p:stCondLst>
+                                            <p:cond delay="0"/>
+                                          </p:stCondLst>
+                                        </p:cTn>
+                                        <p:tgtEl>
+                                          <p:spTgt spid="4"/>
+                                        </p:tgtEl>
+                                        <p:attrNameLst>
+                                          <p:attrName>style.visibility</p:attrName>
+                                        </p:attrNameLst>
+                                      </p:cBhvr>
+                                      <p:to>
+                                        <p:strVal val="visible"/>
+                                      </p:to>
+                                    </p:set>
+                                    <p:anim calcmode="lin" valueType="num">
+                                      <p:cBhvr additive="base">
+                                        <p:cTn id="13" dur="500" fill="hold"/>
+                                        <p:tgtEl>
+                                          <p:spTgt spid="4"/>
+                                        </p:tgtEl>
+                                        <p:attrNameLst>
+                                          <p:attrName>ppt_x</p:attrName>
+                                        </p:attrNameLst>
+                                      </p:cBhvr>
+                                      <p:tavLst>
+                                        <p:tav tm="0">
+                                          <p:val>
+                                            <p:strVal val="#ppt_x"/>
+                                          </p:val>
+                                        </p:tav>
+                                        <p:tav tm="100000">
+                                          <p:val>
+                                            <p:strVal val="#ppt_x"/>
+                                          </p:val>
+                                        </p:tav>
+                                      </p:tavLst>
+                                    </p:anim>
+                                    <p:anim calcmode="lin" valueType="num">
+                                      <p:cBhvr additive="base">
+                                        <p:cTn id="14" dur="500" fill="hold"/>
+                                        <p:tgtEl>
+                                          <p:spTgt spid="4"/>
+                                        </p:tgtEl>
+                                        <p:attrNameLst>
+                                          <p:attrName>ppt_y</p:attrName>
+                                        </p:attrNameLst>
+                                      </p:cBhvr>
+                                      <p:tavLst>
+                                        <p:tav tm="0">
+                                          <p:val>
+                                            <p:strVal val="1+#ppt_h/2"/>
+                                          </p:val>
+                                        </p:tav>
+                                        <p:tav tm="100000">
+                                          <p:val>
+                                            <p:strVal val="#ppt_y"/>
+                                          </p:val>
+                                        </p:tav>
+                                      </p:tavLst>
+                                    </p:anim>
+                                  </p:childTnLst>
+                                </p:cTn>
+                              </p:par>
+                            </p:childTnLst>
+                          </p:cTn>
+                        </p:par>
+                      </p:childTnLst>
+                    </p:cTn>
+                  </p:par>
+                </p:childTnLst>
+              </p:cTn>
+              <p:prevCondLst>
+                <p:cond evt="onPrev" delay="0">
+                  <p:tgtEl>
+                    <p:sldTgt/>
+                  </p:tgtEl>
+                </p:cond>
+              </p:prevCondLst>
+              <p:nextCondLst>
+                <p:cond evt="onNext" delay="0">
+                  <p:tgtEl>
+                    <p:sldTgt/>
+                  </p:tgtEl>
+                </p:cond>
+              </p:nextCondLst>
+            </p:seq>
+          </p:childTnLst>
+        </p:cTn>
       </p:par>
     </p:tnLst>
+    <p:bldLst>
+      <p:bldP spid="3" grpId="0" build="p"/>
+    </p:bldLst>
   </p:timing>
 </p:sld>
 </file>
@@ -5962,25 +6701,6 @@
               <a:rPr lang="zh-CN" altLang="en-US" dirty="0" smtClean="0"/>
               <a:t>协议</a:t>
             </a:r>
-            <a:endParaRPr lang="zh-CN" altLang="en-US" dirty="0"/>
-          </a:p>
-        </p:txBody>
-      </p:sp>
-      <p:sp>
-        <p:nvSpPr>
-          <p:cNvPr id="3" name="内容占位符 2"/>
-          <p:cNvSpPr>
-            <a:spLocks noGrp="1"/>
-          </p:cNvSpPr>
-          <p:nvPr>
-            <p:ph idx="1"/>
-          </p:nvPr>
-        </p:nvSpPr>
-        <p:spPr/>
-        <p:txBody>
-          <a:bodyPr/>
-          <a:lstStyle/>
-          <a:p>
             <a:endParaRPr lang="zh-CN" altLang="en-US" dirty="0"/>
           </a:p>
         </p:txBody>
@@ -6019,6 +6739,13 @@
   <p:clrMapOvr>
     <a:masterClrMapping/>
   </p:clrMapOvr>
+  <p:timing>
+    <p:tnLst>
+      <p:par>
+        <p:cTn id="1" dur="indefinite" restart="never" nodeType="tmRoot"/>
+      </p:par>
+    </p:tnLst>
+  </p:timing>
 </p:sld>
 </file>
 
@@ -6099,6 +6826,13 @@
   <p:clrMapOvr>
     <a:masterClrMapping/>
   </p:clrMapOvr>
+  <p:timing>
+    <p:tnLst>
+      <p:par>
+        <p:cTn id="1" dur="indefinite" restart="never" nodeType="tmRoot"/>
+      </p:par>
+    </p:tnLst>
+  </p:timing>
 </p:sld>
 </file>
 
@@ -6161,8 +6895,8 @@
         </p:blipFill>
         <p:spPr>
           <a:xfrm>
-            <a:off x="3377790" y="1136532"/>
-            <a:ext cx="7976010" cy="4584936"/>
+            <a:off x="3256766" y="1183596"/>
+            <a:ext cx="9871260" cy="5674403"/>
           </a:xfrm>
           <a:prstGeom prst="rect">
             <a:avLst/>
@@ -6179,10 +6913,116 @@
   <p:clrMapOvr>
     <a:masterClrMapping/>
   </p:clrMapOvr>
+  <p:timing>
+    <p:tnLst>
+      <p:par>
+        <p:cTn id="1" dur="indefinite" restart="never" nodeType="tmRoot"/>
+      </p:par>
+    </p:tnLst>
+  </p:timing>
 </p:sld>
 </file>
 
 <file path=ppt/slides/slide16.xml><?xml version="1.0" encoding="utf-8"?>
+<p:sld xmlns:a="http://schemas.openxmlformats.org/drawingml/2006/main" xmlns:r="http://schemas.openxmlformats.org/officeDocument/2006/relationships" xmlns:p="http://schemas.openxmlformats.org/presentationml/2006/main">
+  <p:cSld>
+    <p:spTree>
+      <p:nvGrpSpPr>
+        <p:cNvPr id="1" name=""/>
+        <p:cNvGrpSpPr/>
+        <p:nvPr/>
+      </p:nvGrpSpPr>
+      <p:grpSpPr>
+        <a:xfrm>
+          <a:off x="0" y="0"/>
+          <a:ext cx="0" cy="0"/>
+          <a:chOff x="0" y="0"/>
+          <a:chExt cx="0" cy="0"/>
+        </a:xfrm>
+      </p:grpSpPr>
+      <p:sp>
+        <p:nvSpPr>
+          <p:cNvPr id="2" name="标题 1"/>
+          <p:cNvSpPr>
+            <a:spLocks noGrp="1"/>
+          </p:cNvSpPr>
+          <p:nvPr>
+            <p:ph type="title"/>
+          </p:nvPr>
+        </p:nvSpPr>
+        <p:spPr/>
+        <p:txBody>
+          <a:bodyPr/>
+          <a:lstStyle/>
+          <a:p>
+            <a:r>
+              <a:rPr lang="zh-CN" altLang="en-US" dirty="0" smtClean="0"/>
+              <a:t>大家觉得</a:t>
+            </a:r>
+            <a:r>
+              <a:rPr lang="en-US" altLang="zh-CN" dirty="0" err="1" smtClean="0"/>
+              <a:t>wireshark</a:t>
+            </a:r>
+            <a:r>
+              <a:rPr lang="zh-CN" altLang="en-US" dirty="0" smtClean="0"/>
+              <a:t>是工作在哪一层</a:t>
+            </a:r>
+            <a:r>
+              <a:rPr lang="en-US" altLang="zh-CN" dirty="0" smtClean="0"/>
+              <a:t>?</a:t>
+            </a:r>
+            <a:endParaRPr lang="zh-CN" altLang="en-US" dirty="0"/>
+          </a:p>
+        </p:txBody>
+      </p:sp>
+      <p:sp>
+        <p:nvSpPr>
+          <p:cNvPr id="3" name="内容占位符 2"/>
+          <p:cNvSpPr>
+            <a:spLocks noGrp="1"/>
+          </p:cNvSpPr>
+          <p:nvPr>
+            <p:ph idx="1"/>
+          </p:nvPr>
+        </p:nvSpPr>
+        <p:spPr/>
+        <p:txBody>
+          <a:bodyPr/>
+          <a:lstStyle/>
+          <a:p>
+            <a:r>
+              <a:rPr lang="zh-CN" altLang="en-US" dirty="0" smtClean="0"/>
+              <a:t>他可以分析网卡中的数据流动</a:t>
+            </a:r>
+            <a:r>
+              <a:rPr lang="en-US" altLang="zh-CN" smtClean="0"/>
+              <a:t>.</a:t>
+            </a:r>
+            <a:endParaRPr lang="zh-CN" altLang="en-US" dirty="0"/>
+          </a:p>
+        </p:txBody>
+      </p:sp>
+    </p:spTree>
+    <p:extLst>
+      <p:ext uri="{BB962C8B-B14F-4D97-AF65-F5344CB8AC3E}">
+        <p14:creationId xmlns:p14="http://schemas.microsoft.com/office/powerpoint/2010/main" val="4248991351"/>
+      </p:ext>
+    </p:extLst>
+  </p:cSld>
+  <p:clrMapOvr>
+    <a:masterClrMapping/>
+  </p:clrMapOvr>
+  <p:timing>
+    <p:tnLst>
+      <p:par>
+        <p:cTn id="1" dur="indefinite" restart="never" nodeType="tmRoot"/>
+      </p:par>
+    </p:tnLst>
+  </p:timing>
+</p:sld>
+</file>
+
+<file path=ppt/slides/slide17.xml><?xml version="1.0" encoding="utf-8"?>
 <p:sld xmlns:a="http://schemas.openxmlformats.org/drawingml/2006/main" xmlns:r="http://schemas.openxmlformats.org/officeDocument/2006/relationships" xmlns:p="http://schemas.openxmlformats.org/presentationml/2006/main">
   <p:cSld>
     <p:spTree>
@@ -6347,13 +7187,20 @@
     </p:spTree>
     <p:extLst>
       <p:ext uri="{BB962C8B-B14F-4D97-AF65-F5344CB8AC3E}">
-        <p14:creationId xmlns:p14="http://schemas.microsoft.com/office/powerpoint/2010/main" val="4248991351"/>
+        <p14:creationId xmlns:p14="http://schemas.microsoft.com/office/powerpoint/2010/main" val="2170943918"/>
       </p:ext>
     </p:extLst>
   </p:cSld>
   <p:clrMapOvr>
     <a:masterClrMapping/>
   </p:clrMapOvr>
+  <p:timing>
+    <p:tnLst>
+      <p:par>
+        <p:cTn id="1" dur="indefinite" restart="never" nodeType="tmRoot"/>
+      </p:par>
+    </p:tnLst>
+  </p:timing>
 </p:sld>
 </file>
 
@@ -6689,11 +7536,7 @@
           <a:p>
             <a:r>
               <a:rPr lang="zh-CN" altLang="en-US" dirty="0" smtClean="0"/>
-              <a:t>地址</a:t>
-            </a:r>
-            <a:r>
-              <a:rPr lang="zh-CN" altLang="en-US" dirty="0" smtClean="0"/>
-              <a:t>解析协议</a:t>
+              <a:t>地址解析协议</a:t>
             </a:r>
             <a:r>
               <a:rPr lang="en-US" altLang="zh-CN" dirty="0" smtClean="0"/>
@@ -6719,7 +7562,7 @@
         </p:blipFill>
         <p:spPr>
           <a:xfrm>
-            <a:off x="269709" y="1825625"/>
+            <a:off x="195818" y="1807152"/>
             <a:ext cx="11811607" cy="3619686"/>
           </a:xfrm>
           <a:prstGeom prst="rect">
@@ -6905,15 +7748,11 @@
             </a:r>
             <a:r>
               <a:rPr lang="en-US" altLang="zh-CN" dirty="0" smtClean="0"/>
-              <a:t>, </a:t>
-            </a:r>
-            <a:r>
-              <a:rPr lang="zh-CN" altLang="en-US" dirty="0" smtClean="0"/>
-              <a:t>传递控制消息</a:t>
-            </a:r>
-            <a:r>
-              <a:rPr lang="en-US" altLang="zh-CN" dirty="0"/>
-              <a:t>.</a:t>
+              <a:t>,</a:t>
+            </a:r>
+            <a:r>
+              <a:rPr lang="zh-CN" altLang="en-US" dirty="0"/>
+              <a:t>主要用于在主机与路由器之间传递控制信息，包括报告错误、交换受限控制和状态信息等。</a:t>
             </a:r>
             <a:endParaRPr lang="zh-CN" altLang="en-US" dirty="0"/>
           </a:p>
@@ -6928,15 +7767,15 @@
           <p:nvPr/>
         </p:nvPicPr>
         <p:blipFill>
-          <a:blip r:embed="rId2"/>
+          <a:blip r:embed="rId3"/>
           <a:stretch>
             <a:fillRect/>
           </a:stretch>
         </p:blipFill>
         <p:spPr>
           <a:xfrm>
-            <a:off x="228601" y="2734403"/>
-            <a:ext cx="7118954" cy="3703341"/>
+            <a:off x="228601" y="2727679"/>
+            <a:ext cx="7806576" cy="4061048"/>
           </a:xfrm>
           <a:prstGeom prst="rect">
             <a:avLst/>
@@ -6953,6 +7792,13 @@
   <p:clrMapOvr>
     <a:masterClrMapping/>
   </p:clrMapOvr>
+  <p:timing>
+    <p:tnLst>
+      <p:par>
+        <p:cTn id="1" dur="indefinite" restart="never" nodeType="tmRoot"/>
+      </p:par>
+    </p:tnLst>
+  </p:timing>
 </p:sld>
 </file>
 
@@ -7034,6 +7880,13 @@
   <p:clrMapOvr>
     <a:masterClrMapping/>
   </p:clrMapOvr>
+  <p:timing>
+    <p:tnLst>
+      <p:par>
+        <p:cTn id="1" dur="indefinite" restart="never" nodeType="tmRoot"/>
+      </p:par>
+    </p:tnLst>
+  </p:timing>
 </p:sld>
 </file>
 
@@ -7099,8 +7952,8 @@
         </p:blipFill>
         <p:spPr>
           <a:xfrm>
-            <a:off x="1051611" y="1690688"/>
-            <a:ext cx="7806062" cy="4825566"/>
+            <a:off x="2483245" y="365125"/>
+            <a:ext cx="10398357" cy="6428076"/>
           </a:xfrm>
           <a:prstGeom prst="rect">
             <a:avLst/>
@@ -7117,6 +7970,13 @@
   <p:clrMapOvr>
     <a:masterClrMapping/>
   </p:clrMapOvr>
+  <p:timing>
+    <p:tnLst>
+      <p:par>
+        <p:cTn id="1" dur="indefinite" restart="never" nodeType="tmRoot"/>
+      </p:par>
+    </p:tnLst>
+  </p:timing>
 </p:sld>
 </file>
 

</xml_diff>